<commit_message>
Redesign the figure, and add more content to post
</commit_message>
<xml_diff>
--- a/posts/2023-01-10-join-duplicates/expansao.pptx
+++ b/posts/2023-01-10-join-duplicates/expansao.pptx
@@ -1,19 +1,119 @@
 
 <file path=ppt/presentation.xml><?xml version="1.0" encoding="utf-8"?>
-<p:presentation xmlns:a="http://schemas.openxmlformats.org/drawingml/2006/main" xmlns:p="http://schemas.openxmlformats.org/presentationml/2006/main" xmlns:r="http://schemas.openxmlformats.org/officeDocument/2006/relationships" xmlns:p14="http://schemas.microsoft.com/office/powerpoint/2010/main" xmlns:p15="http://schemas.microsoft.com/office/powerpoint/2012/main" xmlns:mc="http://schemas.openxmlformats.org/markup-compatibility/2006">
+<p:presentation xmlns:a="http://schemas.openxmlformats.org/drawingml/2006/main" xmlns:r="http://schemas.openxmlformats.org/officeDocument/2006/relationships" xmlns:p="http://schemas.openxmlformats.org/presentationml/2006/main">
   <p:sldMasterIdLst>
-    <p:sldMasterId id="2147483648" r:id="rId2"/>
+    <p:sldMasterId id="2147483648" r:id="rId1"/>
   </p:sldMasterIdLst>
   <p:sldIdLst>
-    <p:sldId id="256" r:id="rId3"/>
+    <p:sldId id="256" r:id="rId2"/>
   </p:sldIdLst>
   <p:sldSz cx="10080625" cy="5670550"/>
-  <p:notesSz cx="7559675" cy="10691812"/>
+  <p:notesSz cx="7559675" cy="10691813"/>
+  <p:defaultTextStyle>
+    <a:defPPr>
+      <a:defRPr lang="pt-BR"/>
+    </a:defPPr>
+    <a:lvl1pPr marL="0" algn="l" defTabSz="914400" rtl="0" eaLnBrk="1" latinLnBrk="0" hangingPunct="1">
+      <a:defRPr sz="1800" kern="1200">
+        <a:solidFill>
+          <a:schemeClr val="tx1"/>
+        </a:solidFill>
+        <a:latin typeface="+mn-lt"/>
+        <a:ea typeface="+mn-ea"/>
+        <a:cs typeface="+mn-cs"/>
+      </a:defRPr>
+    </a:lvl1pPr>
+    <a:lvl2pPr marL="457200" algn="l" defTabSz="914400" rtl="0" eaLnBrk="1" latinLnBrk="0" hangingPunct="1">
+      <a:defRPr sz="1800" kern="1200">
+        <a:solidFill>
+          <a:schemeClr val="tx1"/>
+        </a:solidFill>
+        <a:latin typeface="+mn-lt"/>
+        <a:ea typeface="+mn-ea"/>
+        <a:cs typeface="+mn-cs"/>
+      </a:defRPr>
+    </a:lvl2pPr>
+    <a:lvl3pPr marL="914400" algn="l" defTabSz="914400" rtl="0" eaLnBrk="1" latinLnBrk="0" hangingPunct="1">
+      <a:defRPr sz="1800" kern="1200">
+        <a:solidFill>
+          <a:schemeClr val="tx1"/>
+        </a:solidFill>
+        <a:latin typeface="+mn-lt"/>
+        <a:ea typeface="+mn-ea"/>
+        <a:cs typeface="+mn-cs"/>
+      </a:defRPr>
+    </a:lvl3pPr>
+    <a:lvl4pPr marL="1371600" algn="l" defTabSz="914400" rtl="0" eaLnBrk="1" latinLnBrk="0" hangingPunct="1">
+      <a:defRPr sz="1800" kern="1200">
+        <a:solidFill>
+          <a:schemeClr val="tx1"/>
+        </a:solidFill>
+        <a:latin typeface="+mn-lt"/>
+        <a:ea typeface="+mn-ea"/>
+        <a:cs typeface="+mn-cs"/>
+      </a:defRPr>
+    </a:lvl4pPr>
+    <a:lvl5pPr marL="1828800" algn="l" defTabSz="914400" rtl="0" eaLnBrk="1" latinLnBrk="0" hangingPunct="1">
+      <a:defRPr sz="1800" kern="1200">
+        <a:solidFill>
+          <a:schemeClr val="tx1"/>
+        </a:solidFill>
+        <a:latin typeface="+mn-lt"/>
+        <a:ea typeface="+mn-ea"/>
+        <a:cs typeface="+mn-cs"/>
+      </a:defRPr>
+    </a:lvl5pPr>
+    <a:lvl6pPr marL="2286000" algn="l" defTabSz="914400" rtl="0" eaLnBrk="1" latinLnBrk="0" hangingPunct="1">
+      <a:defRPr sz="1800" kern="1200">
+        <a:solidFill>
+          <a:schemeClr val="tx1"/>
+        </a:solidFill>
+        <a:latin typeface="+mn-lt"/>
+        <a:ea typeface="+mn-ea"/>
+        <a:cs typeface="+mn-cs"/>
+      </a:defRPr>
+    </a:lvl6pPr>
+    <a:lvl7pPr marL="2743200" algn="l" defTabSz="914400" rtl="0" eaLnBrk="1" latinLnBrk="0" hangingPunct="1">
+      <a:defRPr sz="1800" kern="1200">
+        <a:solidFill>
+          <a:schemeClr val="tx1"/>
+        </a:solidFill>
+        <a:latin typeface="+mn-lt"/>
+        <a:ea typeface="+mn-ea"/>
+        <a:cs typeface="+mn-cs"/>
+      </a:defRPr>
+    </a:lvl7pPr>
+    <a:lvl8pPr marL="3200400" algn="l" defTabSz="914400" rtl="0" eaLnBrk="1" latinLnBrk="0" hangingPunct="1">
+      <a:defRPr sz="1800" kern="1200">
+        <a:solidFill>
+          <a:schemeClr val="tx1"/>
+        </a:solidFill>
+        <a:latin typeface="+mn-lt"/>
+        <a:ea typeface="+mn-ea"/>
+        <a:cs typeface="+mn-cs"/>
+      </a:defRPr>
+    </a:lvl8pPr>
+    <a:lvl9pPr marL="3657600" algn="l" defTabSz="914400" rtl="0" eaLnBrk="1" latinLnBrk="0" hangingPunct="1">
+      <a:defRPr sz="1800" kern="1200">
+        <a:solidFill>
+          <a:schemeClr val="tx1"/>
+        </a:solidFill>
+        <a:latin typeface="+mn-lt"/>
+        <a:ea typeface="+mn-ea"/>
+        <a:cs typeface="+mn-cs"/>
+      </a:defRPr>
+    </a:lvl9pPr>
+  </p:defaultTextStyle>
+  <p:extLst>
+    <p:ext uri="{EFAFB233-063F-42B5-8137-9DF3F51BA10A}">
+      <p15:sldGuideLst xmlns:p15="http://schemas.microsoft.com/office/powerpoint/2012/main"/>
+    </p:ext>
+  </p:extLst>
 </p:presentation>
 </file>
 
 <file path=ppt/slideLayouts/slideLayout1.xml><?xml version="1.0" encoding="utf-8"?>
-<p:sldLayout xmlns:a="http://schemas.openxmlformats.org/drawingml/2006/main" xmlns:p="http://schemas.openxmlformats.org/presentationml/2006/main" xmlns:r="http://schemas.openxmlformats.org/officeDocument/2006/relationships" xmlns:p14="http://schemas.microsoft.com/office/powerpoint/2010/main" xmlns:p15="http://schemas.microsoft.com/office/powerpoint/2012/main" xmlns:mc="http://schemas.openxmlformats.org/markup-compatibility/2006" type="blank" preserve="1">
+<p:sldLayout xmlns:a="http://schemas.openxmlformats.org/drawingml/2006/main" xmlns:r="http://schemas.openxmlformats.org/officeDocument/2006/relationships" xmlns:p="http://schemas.openxmlformats.org/presentationml/2006/main" type="blank" preserve="1">
   <p:cSld name="Blank Slide">
     <p:spTree>
       <p:nvGrpSpPr>
@@ -31,11 +131,14 @@
       </p:grpSpPr>
     </p:spTree>
   </p:cSld>
+  <p:clrMapOvr>
+    <a:masterClrMapping/>
+  </p:clrMapOvr>
 </p:sldLayout>
 </file>
 
 <file path=ppt/slideLayouts/slideLayout10.xml><?xml version="1.0" encoding="utf-8"?>
-<p:sldLayout xmlns:a="http://schemas.openxmlformats.org/drawingml/2006/main" xmlns:p="http://schemas.openxmlformats.org/presentationml/2006/main" xmlns:r="http://schemas.openxmlformats.org/officeDocument/2006/relationships" xmlns:p14="http://schemas.microsoft.com/office/powerpoint/2010/main" xmlns:p15="http://schemas.microsoft.com/office/powerpoint/2012/main" xmlns:mc="http://schemas.openxmlformats.org/markup-compatibility/2006" type="objOverTx" preserve="1">
+<p:sldLayout xmlns:a="http://schemas.openxmlformats.org/drawingml/2006/main" xmlns:r="http://schemas.openxmlformats.org/officeDocument/2006/relationships" xmlns:p="http://schemas.openxmlformats.org/presentationml/2006/main" type="objOverTx" preserve="1">
   <p:cSld name="Title, Content over Content">
     <p:spTree>
       <p:nvGrpSpPr>
@@ -71,12 +174,13 @@
           </a:prstGeom>
         </p:spPr>
         <p:txBody>
-          <a:bodyPr lIns="0" rIns="0" tIns="0" bIns="0" anchor="ctr">
+          <a:bodyPr lIns="0" tIns="0" rIns="0" bIns="0" anchor="ctr">
             <a:noAutofit/>
           </a:bodyPr>
+          <a:lstStyle/>
           <a:p>
             <a:pPr algn="ctr"/>
-            <a:endParaRPr b="0" lang="pt-BR" sz="4400" spc="-1" strike="noStrike">
+            <a:endParaRPr lang="pt-BR" sz="4400" b="0" strike="noStrike" spc="-1">
               <a:latin typeface="Arial"/>
             </a:endParaRPr>
           </a:p>
@@ -102,11 +206,12 @@
           </a:prstGeom>
         </p:spPr>
         <p:txBody>
-          <a:bodyPr lIns="0" rIns="0" tIns="0" bIns="0">
+          <a:bodyPr lIns="0" tIns="0" rIns="0" bIns="0">
             <a:normAutofit/>
           </a:bodyPr>
-          <a:p>
-            <a:endParaRPr b="0" lang="pt-BR" sz="3200" spc="-1" strike="noStrike">
+          <a:lstStyle/>
+          <a:p>
+            <a:endParaRPr lang="pt-BR" sz="3200" b="0" strike="noStrike" spc="-1">
               <a:latin typeface="Arial"/>
             </a:endParaRPr>
           </a:p>
@@ -132,11 +237,12 @@
           </a:prstGeom>
         </p:spPr>
         <p:txBody>
-          <a:bodyPr lIns="0" rIns="0" tIns="0" bIns="0">
+          <a:bodyPr lIns="0" tIns="0" rIns="0" bIns="0">
             <a:normAutofit/>
           </a:bodyPr>
-          <a:p>
-            <a:endParaRPr b="0" lang="pt-BR" sz="3200" spc="-1" strike="noStrike">
+          <a:lstStyle/>
+          <a:p>
+            <a:endParaRPr lang="pt-BR" sz="3200" b="0" strike="noStrike" spc="-1">
               <a:latin typeface="Arial"/>
             </a:endParaRPr>
           </a:p>
@@ -144,11 +250,14 @@
       </p:sp>
     </p:spTree>
   </p:cSld>
+  <p:clrMapOvr>
+    <a:masterClrMapping/>
+  </p:clrMapOvr>
 </p:sldLayout>
 </file>
 
 <file path=ppt/slideLayouts/slideLayout11.xml><?xml version="1.0" encoding="utf-8"?>
-<p:sldLayout xmlns:a="http://schemas.openxmlformats.org/drawingml/2006/main" xmlns:p="http://schemas.openxmlformats.org/presentationml/2006/main" xmlns:r="http://schemas.openxmlformats.org/officeDocument/2006/relationships" xmlns:p14="http://schemas.microsoft.com/office/powerpoint/2010/main" xmlns:p15="http://schemas.microsoft.com/office/powerpoint/2012/main" xmlns:mc="http://schemas.openxmlformats.org/markup-compatibility/2006" type="fourObj" preserve="1">
+<p:sldLayout xmlns:a="http://schemas.openxmlformats.org/drawingml/2006/main" xmlns:r="http://schemas.openxmlformats.org/officeDocument/2006/relationships" xmlns:p="http://schemas.openxmlformats.org/presentationml/2006/main" type="fourObj" preserve="1">
   <p:cSld name="Title, 4 Content">
     <p:spTree>
       <p:nvGrpSpPr>
@@ -184,12 +293,13 @@
           </a:prstGeom>
         </p:spPr>
         <p:txBody>
-          <a:bodyPr lIns="0" rIns="0" tIns="0" bIns="0" anchor="ctr">
+          <a:bodyPr lIns="0" tIns="0" rIns="0" bIns="0" anchor="ctr">
             <a:noAutofit/>
           </a:bodyPr>
+          <a:lstStyle/>
           <a:p>
             <a:pPr algn="ctr"/>
-            <a:endParaRPr b="0" lang="pt-BR" sz="4400" spc="-1" strike="noStrike">
+            <a:endParaRPr lang="pt-BR" sz="4400" b="0" strike="noStrike" spc="-1">
               <a:latin typeface="Arial"/>
             </a:endParaRPr>
           </a:p>
@@ -215,11 +325,12 @@
           </a:prstGeom>
         </p:spPr>
         <p:txBody>
-          <a:bodyPr lIns="0" rIns="0" tIns="0" bIns="0">
+          <a:bodyPr lIns="0" tIns="0" rIns="0" bIns="0">
             <a:normAutofit/>
           </a:bodyPr>
-          <a:p>
-            <a:endParaRPr b="0" lang="pt-BR" sz="3200" spc="-1" strike="noStrike">
+          <a:lstStyle/>
+          <a:p>
+            <a:endParaRPr lang="pt-BR" sz="3200" b="0" strike="noStrike" spc="-1">
               <a:latin typeface="Arial"/>
             </a:endParaRPr>
           </a:p>
@@ -245,11 +356,12 @@
           </a:prstGeom>
         </p:spPr>
         <p:txBody>
-          <a:bodyPr lIns="0" rIns="0" tIns="0" bIns="0">
+          <a:bodyPr lIns="0" tIns="0" rIns="0" bIns="0">
             <a:normAutofit/>
           </a:bodyPr>
-          <a:p>
-            <a:endParaRPr b="0" lang="pt-BR" sz="3200" spc="-1" strike="noStrike">
+          <a:lstStyle/>
+          <a:p>
+            <a:endParaRPr lang="pt-BR" sz="3200" b="0" strike="noStrike" spc="-1">
               <a:latin typeface="Arial"/>
             </a:endParaRPr>
           </a:p>
@@ -275,11 +387,12 @@
           </a:prstGeom>
         </p:spPr>
         <p:txBody>
-          <a:bodyPr lIns="0" rIns="0" tIns="0" bIns="0">
+          <a:bodyPr lIns="0" tIns="0" rIns="0" bIns="0">
             <a:normAutofit/>
           </a:bodyPr>
-          <a:p>
-            <a:endParaRPr b="0" lang="pt-BR" sz="3200" spc="-1" strike="noStrike">
+          <a:lstStyle/>
+          <a:p>
+            <a:endParaRPr lang="pt-BR" sz="3200" b="0" strike="noStrike" spc="-1">
               <a:latin typeface="Arial"/>
             </a:endParaRPr>
           </a:p>
@@ -305,11 +418,12 @@
           </a:prstGeom>
         </p:spPr>
         <p:txBody>
-          <a:bodyPr lIns="0" rIns="0" tIns="0" bIns="0">
+          <a:bodyPr lIns="0" tIns="0" rIns="0" bIns="0">
             <a:normAutofit/>
           </a:bodyPr>
-          <a:p>
-            <a:endParaRPr b="0" lang="pt-BR" sz="3200" spc="-1" strike="noStrike">
+          <a:lstStyle/>
+          <a:p>
+            <a:endParaRPr lang="pt-BR" sz="3200" b="0" strike="noStrike" spc="-1">
               <a:latin typeface="Arial"/>
             </a:endParaRPr>
           </a:p>
@@ -317,11 +431,14 @@
       </p:sp>
     </p:spTree>
   </p:cSld>
+  <p:clrMapOvr>
+    <a:masterClrMapping/>
+  </p:clrMapOvr>
 </p:sldLayout>
 </file>
 
 <file path=ppt/slideLayouts/slideLayout12.xml><?xml version="1.0" encoding="utf-8"?>
-<p:sldLayout xmlns:a="http://schemas.openxmlformats.org/drawingml/2006/main" xmlns:p="http://schemas.openxmlformats.org/presentationml/2006/main" xmlns:r="http://schemas.openxmlformats.org/officeDocument/2006/relationships" xmlns:p14="http://schemas.microsoft.com/office/powerpoint/2010/main" xmlns:p15="http://schemas.microsoft.com/office/powerpoint/2012/main" xmlns:mc="http://schemas.openxmlformats.org/markup-compatibility/2006" type="blank" preserve="1">
+<p:sldLayout xmlns:a="http://schemas.openxmlformats.org/drawingml/2006/main" xmlns:r="http://schemas.openxmlformats.org/officeDocument/2006/relationships" xmlns:p="http://schemas.openxmlformats.org/presentationml/2006/main" type="blank" preserve="1">
   <p:cSld name="Title, 6 Content">
     <p:spTree>
       <p:nvGrpSpPr>
@@ -357,12 +474,13 @@
           </a:prstGeom>
         </p:spPr>
         <p:txBody>
-          <a:bodyPr lIns="0" rIns="0" tIns="0" bIns="0" anchor="ctr">
+          <a:bodyPr lIns="0" tIns="0" rIns="0" bIns="0" anchor="ctr">
             <a:noAutofit/>
           </a:bodyPr>
+          <a:lstStyle/>
           <a:p>
             <a:pPr algn="ctr"/>
-            <a:endParaRPr b="0" lang="pt-BR" sz="4400" spc="-1" strike="noStrike">
+            <a:endParaRPr lang="pt-BR" sz="4400" b="0" strike="noStrike" spc="-1">
               <a:latin typeface="Arial"/>
             </a:endParaRPr>
           </a:p>
@@ -388,11 +506,12 @@
           </a:prstGeom>
         </p:spPr>
         <p:txBody>
-          <a:bodyPr lIns="0" rIns="0" tIns="0" bIns="0">
+          <a:bodyPr lIns="0" tIns="0" rIns="0" bIns="0">
             <a:normAutofit/>
           </a:bodyPr>
-          <a:p>
-            <a:endParaRPr b="0" lang="pt-BR" sz="3200" spc="-1" strike="noStrike">
+          <a:lstStyle/>
+          <a:p>
+            <a:endParaRPr lang="pt-BR" sz="3200" b="0" strike="noStrike" spc="-1">
               <a:latin typeface="Arial"/>
             </a:endParaRPr>
           </a:p>
@@ -418,11 +537,12 @@
           </a:prstGeom>
         </p:spPr>
         <p:txBody>
-          <a:bodyPr lIns="0" rIns="0" tIns="0" bIns="0">
+          <a:bodyPr lIns="0" tIns="0" rIns="0" bIns="0">
             <a:normAutofit/>
           </a:bodyPr>
-          <a:p>
-            <a:endParaRPr b="0" lang="pt-BR" sz="3200" spc="-1" strike="noStrike">
+          <a:lstStyle/>
+          <a:p>
+            <a:endParaRPr lang="pt-BR" sz="3200" b="0" strike="noStrike" spc="-1">
               <a:latin typeface="Arial"/>
             </a:endParaRPr>
           </a:p>
@@ -448,11 +568,12 @@
           </a:prstGeom>
         </p:spPr>
         <p:txBody>
-          <a:bodyPr lIns="0" rIns="0" tIns="0" bIns="0">
+          <a:bodyPr lIns="0" tIns="0" rIns="0" bIns="0">
             <a:normAutofit/>
           </a:bodyPr>
-          <a:p>
-            <a:endParaRPr b="0" lang="pt-BR" sz="3200" spc="-1" strike="noStrike">
+          <a:lstStyle/>
+          <a:p>
+            <a:endParaRPr lang="pt-BR" sz="3200" b="0" strike="noStrike" spc="-1">
               <a:latin typeface="Arial"/>
             </a:endParaRPr>
           </a:p>
@@ -478,11 +599,12 @@
           </a:prstGeom>
         </p:spPr>
         <p:txBody>
-          <a:bodyPr lIns="0" rIns="0" tIns="0" bIns="0">
+          <a:bodyPr lIns="0" tIns="0" rIns="0" bIns="0">
             <a:normAutofit/>
           </a:bodyPr>
-          <a:p>
-            <a:endParaRPr b="0" lang="pt-BR" sz="3200" spc="-1" strike="noStrike">
+          <a:lstStyle/>
+          <a:p>
+            <a:endParaRPr lang="pt-BR" sz="3200" b="0" strike="noStrike" spc="-1">
               <a:latin typeface="Arial"/>
             </a:endParaRPr>
           </a:p>
@@ -508,11 +630,12 @@
           </a:prstGeom>
         </p:spPr>
         <p:txBody>
-          <a:bodyPr lIns="0" rIns="0" tIns="0" bIns="0">
+          <a:bodyPr lIns="0" tIns="0" rIns="0" bIns="0">
             <a:normAutofit/>
           </a:bodyPr>
-          <a:p>
-            <a:endParaRPr b="0" lang="pt-BR" sz="3200" spc="-1" strike="noStrike">
+          <a:lstStyle/>
+          <a:p>
+            <a:endParaRPr lang="pt-BR" sz="3200" b="0" strike="noStrike" spc="-1">
               <a:latin typeface="Arial"/>
             </a:endParaRPr>
           </a:p>
@@ -538,11 +661,12 @@
           </a:prstGeom>
         </p:spPr>
         <p:txBody>
-          <a:bodyPr lIns="0" rIns="0" tIns="0" bIns="0">
+          <a:bodyPr lIns="0" tIns="0" rIns="0" bIns="0">
             <a:normAutofit/>
           </a:bodyPr>
-          <a:p>
-            <a:endParaRPr b="0" lang="pt-BR" sz="3200" spc="-1" strike="noStrike">
+          <a:lstStyle/>
+          <a:p>
+            <a:endParaRPr lang="pt-BR" sz="3200" b="0" strike="noStrike" spc="-1">
               <a:latin typeface="Arial"/>
             </a:endParaRPr>
           </a:p>
@@ -550,11 +674,14 @@
       </p:sp>
     </p:spTree>
   </p:cSld>
+  <p:clrMapOvr>
+    <a:masterClrMapping/>
+  </p:clrMapOvr>
 </p:sldLayout>
 </file>
 
 <file path=ppt/slideLayouts/slideLayout2.xml><?xml version="1.0" encoding="utf-8"?>
-<p:sldLayout xmlns:a="http://schemas.openxmlformats.org/drawingml/2006/main" xmlns:p="http://schemas.openxmlformats.org/presentationml/2006/main" xmlns:r="http://schemas.openxmlformats.org/officeDocument/2006/relationships" xmlns:p14="http://schemas.microsoft.com/office/powerpoint/2010/main" xmlns:p15="http://schemas.microsoft.com/office/powerpoint/2012/main" xmlns:mc="http://schemas.openxmlformats.org/markup-compatibility/2006" type="tx" preserve="1">
+<p:sldLayout xmlns:a="http://schemas.openxmlformats.org/drawingml/2006/main" xmlns:r="http://schemas.openxmlformats.org/officeDocument/2006/relationships" xmlns:p="http://schemas.openxmlformats.org/presentationml/2006/main" type="tx" preserve="1">
   <p:cSld name="Title Slide">
     <p:spTree>
       <p:nvGrpSpPr>
@@ -590,12 +717,13 @@
           </a:prstGeom>
         </p:spPr>
         <p:txBody>
-          <a:bodyPr lIns="0" rIns="0" tIns="0" bIns="0" anchor="ctr">
+          <a:bodyPr lIns="0" tIns="0" rIns="0" bIns="0" anchor="ctr">
             <a:noAutofit/>
           </a:bodyPr>
+          <a:lstStyle/>
           <a:p>
             <a:pPr algn="ctr"/>
-            <a:endParaRPr b="0" lang="pt-BR" sz="4400" spc="-1" strike="noStrike">
+            <a:endParaRPr lang="pt-BR" sz="4400" b="0" strike="noStrike" spc="-1">
               <a:latin typeface="Arial"/>
             </a:endParaRPr>
           </a:p>
@@ -621,12 +749,13 @@
           </a:prstGeom>
         </p:spPr>
         <p:txBody>
-          <a:bodyPr lIns="0" rIns="0" tIns="0" bIns="0" anchor="ctr">
+          <a:bodyPr lIns="0" tIns="0" rIns="0" bIns="0" anchor="ctr">
             <a:noAutofit/>
           </a:bodyPr>
+          <a:lstStyle/>
           <a:p>
             <a:pPr algn="ctr"/>
-            <a:endParaRPr b="0" lang="pt-BR" sz="3200" spc="-1" strike="noStrike">
+            <a:endParaRPr lang="pt-BR" sz="3200" b="0" strike="noStrike" spc="-1">
               <a:latin typeface="Arial"/>
             </a:endParaRPr>
           </a:p>
@@ -634,11 +763,14 @@
       </p:sp>
     </p:spTree>
   </p:cSld>
+  <p:clrMapOvr>
+    <a:masterClrMapping/>
+  </p:clrMapOvr>
 </p:sldLayout>
 </file>
 
 <file path=ppt/slideLayouts/slideLayout3.xml><?xml version="1.0" encoding="utf-8"?>
-<p:sldLayout xmlns:a="http://schemas.openxmlformats.org/drawingml/2006/main" xmlns:p="http://schemas.openxmlformats.org/presentationml/2006/main" xmlns:r="http://schemas.openxmlformats.org/officeDocument/2006/relationships" xmlns:p14="http://schemas.microsoft.com/office/powerpoint/2010/main" xmlns:p15="http://schemas.microsoft.com/office/powerpoint/2012/main" xmlns:mc="http://schemas.openxmlformats.org/markup-compatibility/2006" type="obj" preserve="1">
+<p:sldLayout xmlns:a="http://schemas.openxmlformats.org/drawingml/2006/main" xmlns:r="http://schemas.openxmlformats.org/officeDocument/2006/relationships" xmlns:p="http://schemas.openxmlformats.org/presentationml/2006/main" type="obj" preserve="1">
   <p:cSld name="Title, Content">
     <p:spTree>
       <p:nvGrpSpPr>
@@ -674,12 +806,13 @@
           </a:prstGeom>
         </p:spPr>
         <p:txBody>
-          <a:bodyPr lIns="0" rIns="0" tIns="0" bIns="0" anchor="ctr">
+          <a:bodyPr lIns="0" tIns="0" rIns="0" bIns="0" anchor="ctr">
             <a:noAutofit/>
           </a:bodyPr>
+          <a:lstStyle/>
           <a:p>
             <a:pPr algn="ctr"/>
-            <a:endParaRPr b="0" lang="pt-BR" sz="4400" spc="-1" strike="noStrike">
+            <a:endParaRPr lang="pt-BR" sz="4400" b="0" strike="noStrike" spc="-1">
               <a:latin typeface="Arial"/>
             </a:endParaRPr>
           </a:p>
@@ -705,11 +838,12 @@
           </a:prstGeom>
         </p:spPr>
         <p:txBody>
-          <a:bodyPr lIns="0" rIns="0" tIns="0" bIns="0">
+          <a:bodyPr lIns="0" tIns="0" rIns="0" bIns="0">
             <a:normAutofit/>
           </a:bodyPr>
-          <a:p>
-            <a:endParaRPr b="0" lang="pt-BR" sz="3200" spc="-1" strike="noStrike">
+          <a:lstStyle/>
+          <a:p>
+            <a:endParaRPr lang="pt-BR" sz="3200" b="0" strike="noStrike" spc="-1">
               <a:latin typeface="Arial"/>
             </a:endParaRPr>
           </a:p>
@@ -717,11 +851,14 @@
       </p:sp>
     </p:spTree>
   </p:cSld>
+  <p:clrMapOvr>
+    <a:masterClrMapping/>
+  </p:clrMapOvr>
 </p:sldLayout>
 </file>
 
 <file path=ppt/slideLayouts/slideLayout4.xml><?xml version="1.0" encoding="utf-8"?>
-<p:sldLayout xmlns:a="http://schemas.openxmlformats.org/drawingml/2006/main" xmlns:p="http://schemas.openxmlformats.org/presentationml/2006/main" xmlns:r="http://schemas.openxmlformats.org/officeDocument/2006/relationships" xmlns:p14="http://schemas.microsoft.com/office/powerpoint/2010/main" xmlns:p15="http://schemas.microsoft.com/office/powerpoint/2012/main" xmlns:mc="http://schemas.openxmlformats.org/markup-compatibility/2006" type="twoObj" preserve="1">
+<p:sldLayout xmlns:a="http://schemas.openxmlformats.org/drawingml/2006/main" xmlns:r="http://schemas.openxmlformats.org/officeDocument/2006/relationships" xmlns:p="http://schemas.openxmlformats.org/presentationml/2006/main" type="twoObj" preserve="1">
   <p:cSld name="Title, 2 Content">
     <p:spTree>
       <p:nvGrpSpPr>
@@ -757,12 +894,13 @@
           </a:prstGeom>
         </p:spPr>
         <p:txBody>
-          <a:bodyPr lIns="0" rIns="0" tIns="0" bIns="0" anchor="ctr">
+          <a:bodyPr lIns="0" tIns="0" rIns="0" bIns="0" anchor="ctr">
             <a:noAutofit/>
           </a:bodyPr>
+          <a:lstStyle/>
           <a:p>
             <a:pPr algn="ctr"/>
-            <a:endParaRPr b="0" lang="pt-BR" sz="4400" spc="-1" strike="noStrike">
+            <a:endParaRPr lang="pt-BR" sz="4400" b="0" strike="noStrike" spc="-1">
               <a:latin typeface="Arial"/>
             </a:endParaRPr>
           </a:p>
@@ -788,11 +926,12 @@
           </a:prstGeom>
         </p:spPr>
         <p:txBody>
-          <a:bodyPr lIns="0" rIns="0" tIns="0" bIns="0">
+          <a:bodyPr lIns="0" tIns="0" rIns="0" bIns="0">
             <a:normAutofit/>
           </a:bodyPr>
-          <a:p>
-            <a:endParaRPr b="0" lang="pt-BR" sz="3200" spc="-1" strike="noStrike">
+          <a:lstStyle/>
+          <a:p>
+            <a:endParaRPr lang="pt-BR" sz="3200" b="0" strike="noStrike" spc="-1">
               <a:latin typeface="Arial"/>
             </a:endParaRPr>
           </a:p>
@@ -818,11 +957,12 @@
           </a:prstGeom>
         </p:spPr>
         <p:txBody>
-          <a:bodyPr lIns="0" rIns="0" tIns="0" bIns="0">
+          <a:bodyPr lIns="0" tIns="0" rIns="0" bIns="0">
             <a:normAutofit/>
           </a:bodyPr>
-          <a:p>
-            <a:endParaRPr b="0" lang="pt-BR" sz="3200" spc="-1" strike="noStrike">
+          <a:lstStyle/>
+          <a:p>
+            <a:endParaRPr lang="pt-BR" sz="3200" b="0" strike="noStrike" spc="-1">
               <a:latin typeface="Arial"/>
             </a:endParaRPr>
           </a:p>
@@ -830,11 +970,14 @@
       </p:sp>
     </p:spTree>
   </p:cSld>
+  <p:clrMapOvr>
+    <a:masterClrMapping/>
+  </p:clrMapOvr>
 </p:sldLayout>
 </file>
 
 <file path=ppt/slideLayouts/slideLayout5.xml><?xml version="1.0" encoding="utf-8"?>
-<p:sldLayout xmlns:a="http://schemas.openxmlformats.org/drawingml/2006/main" xmlns:p="http://schemas.openxmlformats.org/presentationml/2006/main" xmlns:r="http://schemas.openxmlformats.org/officeDocument/2006/relationships" xmlns:p14="http://schemas.microsoft.com/office/powerpoint/2010/main" xmlns:p15="http://schemas.microsoft.com/office/powerpoint/2012/main" xmlns:mc="http://schemas.openxmlformats.org/markup-compatibility/2006" type="titleOnly" preserve="1">
+<p:sldLayout xmlns:a="http://schemas.openxmlformats.org/drawingml/2006/main" xmlns:r="http://schemas.openxmlformats.org/officeDocument/2006/relationships" xmlns:p="http://schemas.openxmlformats.org/presentationml/2006/main" type="titleOnly" preserve="1">
   <p:cSld name="Title Only">
     <p:spTree>
       <p:nvGrpSpPr>
@@ -870,12 +1013,13 @@
           </a:prstGeom>
         </p:spPr>
         <p:txBody>
-          <a:bodyPr lIns="0" rIns="0" tIns="0" bIns="0" anchor="ctr">
+          <a:bodyPr lIns="0" tIns="0" rIns="0" bIns="0" anchor="ctr">
             <a:noAutofit/>
           </a:bodyPr>
+          <a:lstStyle/>
           <a:p>
             <a:pPr algn="ctr"/>
-            <a:endParaRPr b="0" lang="pt-BR" sz="4400" spc="-1" strike="noStrike">
+            <a:endParaRPr lang="pt-BR" sz="4400" b="0" strike="noStrike" spc="-1">
               <a:latin typeface="Arial"/>
             </a:endParaRPr>
           </a:p>
@@ -883,11 +1027,14 @@
       </p:sp>
     </p:spTree>
   </p:cSld>
+  <p:clrMapOvr>
+    <a:masterClrMapping/>
+  </p:clrMapOvr>
 </p:sldLayout>
 </file>
 
 <file path=ppt/slideLayouts/slideLayout6.xml><?xml version="1.0" encoding="utf-8"?>
-<p:sldLayout xmlns:a="http://schemas.openxmlformats.org/drawingml/2006/main" xmlns:p="http://schemas.openxmlformats.org/presentationml/2006/main" xmlns:r="http://schemas.openxmlformats.org/officeDocument/2006/relationships" xmlns:p14="http://schemas.microsoft.com/office/powerpoint/2010/main" xmlns:p15="http://schemas.microsoft.com/office/powerpoint/2012/main" xmlns:mc="http://schemas.openxmlformats.org/markup-compatibility/2006" type="objOnly" preserve="1">
+<p:sldLayout xmlns:a="http://schemas.openxmlformats.org/drawingml/2006/main" xmlns:r="http://schemas.openxmlformats.org/officeDocument/2006/relationships" xmlns:p="http://schemas.openxmlformats.org/presentationml/2006/main" type="objOnly" preserve="1">
   <p:cSld name="Centered Text">
     <p:spTree>
       <p:nvGrpSpPr>
@@ -923,12 +1070,13 @@
           </a:prstGeom>
         </p:spPr>
         <p:txBody>
-          <a:bodyPr lIns="0" rIns="0" tIns="0" bIns="0" anchor="ctr">
+          <a:bodyPr lIns="0" tIns="0" rIns="0" bIns="0" anchor="ctr">
             <a:noAutofit/>
           </a:bodyPr>
+          <a:lstStyle/>
           <a:p>
             <a:pPr algn="ctr"/>
-            <a:endParaRPr b="0" lang="pt-BR" sz="3200" spc="-1" strike="noStrike">
+            <a:endParaRPr lang="pt-BR" sz="3200" b="0" strike="noStrike" spc="-1">
               <a:latin typeface="Arial"/>
             </a:endParaRPr>
           </a:p>
@@ -936,11 +1084,14 @@
       </p:sp>
     </p:spTree>
   </p:cSld>
+  <p:clrMapOvr>
+    <a:masterClrMapping/>
+  </p:clrMapOvr>
 </p:sldLayout>
 </file>
 
 <file path=ppt/slideLayouts/slideLayout7.xml><?xml version="1.0" encoding="utf-8"?>
-<p:sldLayout xmlns:a="http://schemas.openxmlformats.org/drawingml/2006/main" xmlns:p="http://schemas.openxmlformats.org/presentationml/2006/main" xmlns:r="http://schemas.openxmlformats.org/officeDocument/2006/relationships" xmlns:p14="http://schemas.microsoft.com/office/powerpoint/2010/main" xmlns:p15="http://schemas.microsoft.com/office/powerpoint/2012/main" xmlns:mc="http://schemas.openxmlformats.org/markup-compatibility/2006" type="twoObjAndObj" preserve="1">
+<p:sldLayout xmlns:a="http://schemas.openxmlformats.org/drawingml/2006/main" xmlns:r="http://schemas.openxmlformats.org/officeDocument/2006/relationships" xmlns:p="http://schemas.openxmlformats.org/presentationml/2006/main" type="twoObjAndObj" preserve="1">
   <p:cSld name="Title, 2 Content and Content">
     <p:spTree>
       <p:nvGrpSpPr>
@@ -976,12 +1127,13 @@
           </a:prstGeom>
         </p:spPr>
         <p:txBody>
-          <a:bodyPr lIns="0" rIns="0" tIns="0" bIns="0" anchor="ctr">
+          <a:bodyPr lIns="0" tIns="0" rIns="0" bIns="0" anchor="ctr">
             <a:noAutofit/>
           </a:bodyPr>
+          <a:lstStyle/>
           <a:p>
             <a:pPr algn="ctr"/>
-            <a:endParaRPr b="0" lang="pt-BR" sz="4400" spc="-1" strike="noStrike">
+            <a:endParaRPr lang="pt-BR" sz="4400" b="0" strike="noStrike" spc="-1">
               <a:latin typeface="Arial"/>
             </a:endParaRPr>
           </a:p>
@@ -1007,11 +1159,12 @@
           </a:prstGeom>
         </p:spPr>
         <p:txBody>
-          <a:bodyPr lIns="0" rIns="0" tIns="0" bIns="0">
+          <a:bodyPr lIns="0" tIns="0" rIns="0" bIns="0">
             <a:normAutofit/>
           </a:bodyPr>
-          <a:p>
-            <a:endParaRPr b="0" lang="pt-BR" sz="3200" spc="-1" strike="noStrike">
+          <a:lstStyle/>
+          <a:p>
+            <a:endParaRPr lang="pt-BR" sz="3200" b="0" strike="noStrike" spc="-1">
               <a:latin typeface="Arial"/>
             </a:endParaRPr>
           </a:p>
@@ -1037,11 +1190,12 @@
           </a:prstGeom>
         </p:spPr>
         <p:txBody>
-          <a:bodyPr lIns="0" rIns="0" tIns="0" bIns="0">
+          <a:bodyPr lIns="0" tIns="0" rIns="0" bIns="0">
             <a:normAutofit/>
           </a:bodyPr>
-          <a:p>
-            <a:endParaRPr b="0" lang="pt-BR" sz="3200" spc="-1" strike="noStrike">
+          <a:lstStyle/>
+          <a:p>
+            <a:endParaRPr lang="pt-BR" sz="3200" b="0" strike="noStrike" spc="-1">
               <a:latin typeface="Arial"/>
             </a:endParaRPr>
           </a:p>
@@ -1067,11 +1221,12 @@
           </a:prstGeom>
         </p:spPr>
         <p:txBody>
-          <a:bodyPr lIns="0" rIns="0" tIns="0" bIns="0">
+          <a:bodyPr lIns="0" tIns="0" rIns="0" bIns="0">
             <a:normAutofit/>
           </a:bodyPr>
-          <a:p>
-            <a:endParaRPr b="0" lang="pt-BR" sz="3200" spc="-1" strike="noStrike">
+          <a:lstStyle/>
+          <a:p>
+            <a:endParaRPr lang="pt-BR" sz="3200" b="0" strike="noStrike" spc="-1">
               <a:latin typeface="Arial"/>
             </a:endParaRPr>
           </a:p>
@@ -1079,11 +1234,14 @@
       </p:sp>
     </p:spTree>
   </p:cSld>
+  <p:clrMapOvr>
+    <a:masterClrMapping/>
+  </p:clrMapOvr>
 </p:sldLayout>
 </file>
 
 <file path=ppt/slideLayouts/slideLayout8.xml><?xml version="1.0" encoding="utf-8"?>
-<p:sldLayout xmlns:a="http://schemas.openxmlformats.org/drawingml/2006/main" xmlns:p="http://schemas.openxmlformats.org/presentationml/2006/main" xmlns:r="http://schemas.openxmlformats.org/officeDocument/2006/relationships" xmlns:p14="http://schemas.microsoft.com/office/powerpoint/2010/main" xmlns:p15="http://schemas.microsoft.com/office/powerpoint/2012/main" xmlns:mc="http://schemas.openxmlformats.org/markup-compatibility/2006" type="objAndTwoObj" preserve="1">
+<p:sldLayout xmlns:a="http://schemas.openxmlformats.org/drawingml/2006/main" xmlns:r="http://schemas.openxmlformats.org/officeDocument/2006/relationships" xmlns:p="http://schemas.openxmlformats.org/presentationml/2006/main" type="objAndTwoObj" preserve="1">
   <p:cSld name="Title Content and 2 Content">
     <p:spTree>
       <p:nvGrpSpPr>
@@ -1119,12 +1277,13 @@
           </a:prstGeom>
         </p:spPr>
         <p:txBody>
-          <a:bodyPr lIns="0" rIns="0" tIns="0" bIns="0" anchor="ctr">
+          <a:bodyPr lIns="0" tIns="0" rIns="0" bIns="0" anchor="ctr">
             <a:noAutofit/>
           </a:bodyPr>
+          <a:lstStyle/>
           <a:p>
             <a:pPr algn="ctr"/>
-            <a:endParaRPr b="0" lang="pt-BR" sz="4400" spc="-1" strike="noStrike">
+            <a:endParaRPr lang="pt-BR" sz="4400" b="0" strike="noStrike" spc="-1">
               <a:latin typeface="Arial"/>
             </a:endParaRPr>
           </a:p>
@@ -1150,11 +1309,12 @@
           </a:prstGeom>
         </p:spPr>
         <p:txBody>
-          <a:bodyPr lIns="0" rIns="0" tIns="0" bIns="0">
+          <a:bodyPr lIns="0" tIns="0" rIns="0" bIns="0">
             <a:normAutofit/>
           </a:bodyPr>
-          <a:p>
-            <a:endParaRPr b="0" lang="pt-BR" sz="3200" spc="-1" strike="noStrike">
+          <a:lstStyle/>
+          <a:p>
+            <a:endParaRPr lang="pt-BR" sz="3200" b="0" strike="noStrike" spc="-1">
               <a:latin typeface="Arial"/>
             </a:endParaRPr>
           </a:p>
@@ -1180,11 +1340,12 @@
           </a:prstGeom>
         </p:spPr>
         <p:txBody>
-          <a:bodyPr lIns="0" rIns="0" tIns="0" bIns="0">
+          <a:bodyPr lIns="0" tIns="0" rIns="0" bIns="0">
             <a:normAutofit/>
           </a:bodyPr>
-          <a:p>
-            <a:endParaRPr b="0" lang="pt-BR" sz="3200" spc="-1" strike="noStrike">
+          <a:lstStyle/>
+          <a:p>
+            <a:endParaRPr lang="pt-BR" sz="3200" b="0" strike="noStrike" spc="-1">
               <a:latin typeface="Arial"/>
             </a:endParaRPr>
           </a:p>
@@ -1210,11 +1371,12 @@
           </a:prstGeom>
         </p:spPr>
         <p:txBody>
-          <a:bodyPr lIns="0" rIns="0" tIns="0" bIns="0">
+          <a:bodyPr lIns="0" tIns="0" rIns="0" bIns="0">
             <a:normAutofit/>
           </a:bodyPr>
-          <a:p>
-            <a:endParaRPr b="0" lang="pt-BR" sz="3200" spc="-1" strike="noStrike">
+          <a:lstStyle/>
+          <a:p>
+            <a:endParaRPr lang="pt-BR" sz="3200" b="0" strike="noStrike" spc="-1">
               <a:latin typeface="Arial"/>
             </a:endParaRPr>
           </a:p>
@@ -1222,11 +1384,14 @@
       </p:sp>
     </p:spTree>
   </p:cSld>
+  <p:clrMapOvr>
+    <a:masterClrMapping/>
+  </p:clrMapOvr>
 </p:sldLayout>
 </file>
 
 <file path=ppt/slideLayouts/slideLayout9.xml><?xml version="1.0" encoding="utf-8"?>
-<p:sldLayout xmlns:a="http://schemas.openxmlformats.org/drawingml/2006/main" xmlns:p="http://schemas.openxmlformats.org/presentationml/2006/main" xmlns:r="http://schemas.openxmlformats.org/officeDocument/2006/relationships" xmlns:p14="http://schemas.microsoft.com/office/powerpoint/2010/main" xmlns:p15="http://schemas.microsoft.com/office/powerpoint/2012/main" xmlns:mc="http://schemas.openxmlformats.org/markup-compatibility/2006" type="twoObjOverTx" preserve="1">
+<p:sldLayout xmlns:a="http://schemas.openxmlformats.org/drawingml/2006/main" xmlns:r="http://schemas.openxmlformats.org/officeDocument/2006/relationships" xmlns:p="http://schemas.openxmlformats.org/presentationml/2006/main" type="twoObjOverTx" preserve="1">
   <p:cSld name="Title, 2 Content over Content">
     <p:spTree>
       <p:nvGrpSpPr>
@@ -1262,12 +1427,13 @@
           </a:prstGeom>
         </p:spPr>
         <p:txBody>
-          <a:bodyPr lIns="0" rIns="0" tIns="0" bIns="0" anchor="ctr">
+          <a:bodyPr lIns="0" tIns="0" rIns="0" bIns="0" anchor="ctr">
             <a:noAutofit/>
           </a:bodyPr>
+          <a:lstStyle/>
           <a:p>
             <a:pPr algn="ctr"/>
-            <a:endParaRPr b="0" lang="pt-BR" sz="4400" spc="-1" strike="noStrike">
+            <a:endParaRPr lang="pt-BR" sz="4400" b="0" strike="noStrike" spc="-1">
               <a:latin typeface="Arial"/>
             </a:endParaRPr>
           </a:p>
@@ -1293,11 +1459,12 @@
           </a:prstGeom>
         </p:spPr>
         <p:txBody>
-          <a:bodyPr lIns="0" rIns="0" tIns="0" bIns="0">
+          <a:bodyPr lIns="0" tIns="0" rIns="0" bIns="0">
             <a:normAutofit/>
           </a:bodyPr>
-          <a:p>
-            <a:endParaRPr b="0" lang="pt-BR" sz="3200" spc="-1" strike="noStrike">
+          <a:lstStyle/>
+          <a:p>
+            <a:endParaRPr lang="pt-BR" sz="3200" b="0" strike="noStrike" spc="-1">
               <a:latin typeface="Arial"/>
             </a:endParaRPr>
           </a:p>
@@ -1323,11 +1490,12 @@
           </a:prstGeom>
         </p:spPr>
         <p:txBody>
-          <a:bodyPr lIns="0" rIns="0" tIns="0" bIns="0">
+          <a:bodyPr lIns="0" tIns="0" rIns="0" bIns="0">
             <a:normAutofit/>
           </a:bodyPr>
-          <a:p>
-            <a:endParaRPr b="0" lang="pt-BR" sz="3200" spc="-1" strike="noStrike">
+          <a:lstStyle/>
+          <a:p>
+            <a:endParaRPr lang="pt-BR" sz="3200" b="0" strike="noStrike" spc="-1">
               <a:latin typeface="Arial"/>
             </a:endParaRPr>
           </a:p>
@@ -1353,11 +1521,12 @@
           </a:prstGeom>
         </p:spPr>
         <p:txBody>
-          <a:bodyPr lIns="0" rIns="0" tIns="0" bIns="0">
+          <a:bodyPr lIns="0" tIns="0" rIns="0" bIns="0">
             <a:normAutofit/>
           </a:bodyPr>
-          <a:p>
-            <a:endParaRPr b="0" lang="pt-BR" sz="3200" spc="-1" strike="noStrike">
+          <a:lstStyle/>
+          <a:p>
+            <a:endParaRPr lang="pt-BR" sz="3200" b="0" strike="noStrike" spc="-1">
               <a:latin typeface="Arial"/>
             </a:endParaRPr>
           </a:p>
@@ -1365,12 +1534,20 @@
       </p:sp>
     </p:spTree>
   </p:cSld>
+  <p:clrMapOvr>
+    <a:masterClrMapping/>
+  </p:clrMapOvr>
 </p:sldLayout>
 </file>
 
 <file path=ppt/slideMasters/slideMaster1.xml><?xml version="1.0" encoding="utf-8"?>
-<p:sldMaster xmlns:a="http://schemas.openxmlformats.org/drawingml/2006/main" xmlns:p="http://schemas.openxmlformats.org/presentationml/2006/main" xmlns:r="http://schemas.openxmlformats.org/officeDocument/2006/relationships" xmlns:p14="http://schemas.microsoft.com/office/powerpoint/2010/main" xmlns:p15="http://schemas.microsoft.com/office/powerpoint/2012/main" xmlns:mc="http://schemas.openxmlformats.org/markup-compatibility/2006">
+<p:sldMaster xmlns:a="http://schemas.openxmlformats.org/drawingml/2006/main" xmlns:r="http://schemas.openxmlformats.org/officeDocument/2006/relationships" xmlns:p="http://schemas.openxmlformats.org/presentationml/2006/main">
   <p:cSld>
+    <p:bg>
+      <p:bgRef idx="1001">
+        <a:schemeClr val="bg1"/>
+      </p:bgRef>
+    </p:bg>
     <p:spTree>
       <p:nvGrpSpPr>
         <p:cNvPr id="1" name=""/>
@@ -1387,7 +1564,7 @@
       </p:grpSpPr>
       <p:sp>
         <p:nvSpPr>
-          <p:cNvPr id="0" name="PlaceHolder 1"/>
+          <p:cNvPr id="5" name="PlaceHolder 1"/>
           <p:cNvSpPr>
             <a:spLocks noGrp="1"/>
           </p:cNvSpPr>
@@ -1405,26 +1582,24 @@
           </a:prstGeom>
         </p:spPr>
         <p:txBody>
-          <a:bodyPr lIns="0" rIns="0" tIns="0" bIns="0" anchor="ctr">
+          <a:bodyPr lIns="0" tIns="0" rIns="0" bIns="0" anchor="ctr">
             <a:noAutofit/>
           </a:bodyPr>
+          <a:lstStyle/>
           <a:p>
             <a:pPr algn="ctr"/>
             <a:r>
-              <a:rPr b="0" lang="pt-BR" sz="4400" spc="-1" strike="noStrike">
+              <a:rPr lang="pt-BR" sz="4400" b="0" strike="noStrike" spc="-1">
                 <a:latin typeface="Arial"/>
               </a:rPr>
               <a:t>Clique para editar o formato do texto do título</a:t>
             </a:r>
-            <a:endParaRPr b="0" lang="pt-BR" sz="4400" spc="-1" strike="noStrike">
-              <a:latin typeface="Arial"/>
-            </a:endParaRPr>
-          </a:p>
-        </p:txBody>
-      </p:sp>
-      <p:sp>
-        <p:nvSpPr>
-          <p:cNvPr id="1" name="PlaceHolder 2"/>
+          </a:p>
+        </p:txBody>
+      </p:sp>
+      <p:sp>
+        <p:nvSpPr>
+          <p:cNvPr id="6" name="PlaceHolder 2"/>
           <p:cNvSpPr>
             <a:spLocks noGrp="1"/>
           </p:cNvSpPr>
@@ -1442,9 +1617,10 @@
           </a:prstGeom>
         </p:spPr>
         <p:txBody>
-          <a:bodyPr lIns="0" rIns="0" tIns="0" bIns="0">
+          <a:bodyPr lIns="0" tIns="0" rIns="0" bIns="0">
             <a:normAutofit/>
           </a:bodyPr>
+          <a:lstStyle/>
           <a:p>
             <a:pPr marL="432000" indent="-324000">
               <a:spcBef>
@@ -1458,17 +1634,14 @@
               <a:buChar char=""/>
             </a:pPr>
             <a:r>
-              <a:rPr b="0" lang="pt-BR" sz="3200" spc="-1" strike="noStrike">
+              <a:rPr lang="pt-BR" sz="3200" b="0" strike="noStrike" spc="-1">
                 <a:latin typeface="Arial"/>
               </a:rPr>
               <a:t>Clique para editar o formato do texto da estrutura de tópicos</a:t>
             </a:r>
-            <a:endParaRPr b="0" lang="pt-BR" sz="3200" spc="-1" strike="noStrike">
-              <a:latin typeface="Arial"/>
-            </a:endParaRPr>
-          </a:p>
-          <a:p>
-            <a:pPr lvl="1" marL="864000" indent="-324000">
+          </a:p>
+          <a:p>
+            <a:pPr marL="864000" lvl="1" indent="-324000">
               <a:spcBef>
                 <a:spcPts val="1134"/>
               </a:spcBef>
@@ -1480,17 +1653,14 @@
               <a:buChar char=""/>
             </a:pPr>
             <a:r>
-              <a:rPr b="0" lang="pt-BR" sz="2800" spc="-1" strike="noStrike">
+              <a:rPr lang="pt-BR" sz="2800" b="0" strike="noStrike" spc="-1">
                 <a:latin typeface="Arial"/>
               </a:rPr>
               <a:t>2.º nível da estrutura de tópicos</a:t>
             </a:r>
-            <a:endParaRPr b="0" lang="pt-BR" sz="2800" spc="-1" strike="noStrike">
-              <a:latin typeface="Arial"/>
-            </a:endParaRPr>
-          </a:p>
-          <a:p>
-            <a:pPr lvl="2" marL="1296000" indent="-288000">
+          </a:p>
+          <a:p>
+            <a:pPr marL="1296000" lvl="2" indent="-288000">
               <a:spcBef>
                 <a:spcPts val="850"/>
               </a:spcBef>
@@ -1502,17 +1672,14 @@
               <a:buChar char=""/>
             </a:pPr>
             <a:r>
-              <a:rPr b="0" lang="pt-BR" sz="2400" spc="-1" strike="noStrike">
+              <a:rPr lang="pt-BR" sz="2400" b="0" strike="noStrike" spc="-1">
                 <a:latin typeface="Arial"/>
               </a:rPr>
               <a:t>3.º nível da estrutura de tópicos</a:t>
             </a:r>
-            <a:endParaRPr b="0" lang="pt-BR" sz="2400" spc="-1" strike="noStrike">
-              <a:latin typeface="Arial"/>
-            </a:endParaRPr>
-          </a:p>
-          <a:p>
-            <a:pPr lvl="3" marL="1728000" indent="-216000">
+          </a:p>
+          <a:p>
+            <a:pPr marL="1728000" lvl="3" indent="-216000">
               <a:spcBef>
                 <a:spcPts val="567"/>
               </a:spcBef>
@@ -1524,17 +1691,14 @@
               <a:buChar char=""/>
             </a:pPr>
             <a:r>
-              <a:rPr b="0" lang="pt-BR" sz="2000" spc="-1" strike="noStrike">
+              <a:rPr lang="pt-BR" sz="2000" b="0" strike="noStrike" spc="-1">
                 <a:latin typeface="Arial"/>
               </a:rPr>
               <a:t>4.º nível da estrutura de tópicos</a:t>
             </a:r>
-            <a:endParaRPr b="0" lang="pt-BR" sz="2000" spc="-1" strike="noStrike">
-              <a:latin typeface="Arial"/>
-            </a:endParaRPr>
-          </a:p>
-          <a:p>
-            <a:pPr lvl="4" marL="2160000" indent="-216000">
+          </a:p>
+          <a:p>
+            <a:pPr marL="2160000" lvl="4" indent="-216000">
               <a:spcBef>
                 <a:spcPts val="283"/>
               </a:spcBef>
@@ -1546,17 +1710,14 @@
               <a:buChar char=""/>
             </a:pPr>
             <a:r>
-              <a:rPr b="0" lang="pt-BR" sz="2000" spc="-1" strike="noStrike">
+              <a:rPr lang="pt-BR" sz="2000" b="0" strike="noStrike" spc="-1">
                 <a:latin typeface="Arial"/>
               </a:rPr>
               <a:t>5.º nível da estrutura de tópicos</a:t>
             </a:r>
-            <a:endParaRPr b="0" lang="pt-BR" sz="2000" spc="-1" strike="noStrike">
-              <a:latin typeface="Arial"/>
-            </a:endParaRPr>
-          </a:p>
-          <a:p>
-            <a:pPr lvl="5" marL="2592000" indent="-216000">
+          </a:p>
+          <a:p>
+            <a:pPr marL="2592000" lvl="5" indent="-216000">
               <a:spcBef>
                 <a:spcPts val="283"/>
               </a:spcBef>
@@ -1568,17 +1729,14 @@
               <a:buChar char=""/>
             </a:pPr>
             <a:r>
-              <a:rPr b="0" lang="pt-BR" sz="2000" spc="-1" strike="noStrike">
+              <a:rPr lang="pt-BR" sz="2000" b="0" strike="noStrike" spc="-1">
                 <a:latin typeface="Arial"/>
               </a:rPr>
               <a:t>6.º nível da estrutura de tópicos</a:t>
             </a:r>
-            <a:endParaRPr b="0" lang="pt-BR" sz="2000" spc="-1" strike="noStrike">
-              <a:latin typeface="Arial"/>
-            </a:endParaRPr>
-          </a:p>
-          <a:p>
-            <a:pPr lvl="6" marL="3024000" indent="-216000">
+          </a:p>
+          <a:p>
+            <a:pPr marL="3024000" lvl="6" indent="-216000">
               <a:spcBef>
                 <a:spcPts val="283"/>
               </a:spcBef>
@@ -1590,14 +1748,11 @@
               <a:buChar char=""/>
             </a:pPr>
             <a:r>
-              <a:rPr b="0" lang="pt-BR" sz="2000" spc="-1" strike="noStrike">
+              <a:rPr lang="pt-BR" sz="2000" b="0" strike="noStrike" spc="-1">
                 <a:latin typeface="Arial"/>
               </a:rPr>
               <a:t>7.º nível da estrutura de tópicos</a:t>
             </a:r>
-            <a:endParaRPr b="0" lang="pt-BR" sz="2000" spc="-1" strike="noStrike">
-              <a:latin typeface="Arial"/>
-            </a:endParaRPr>
           </a:p>
         </p:txBody>
       </p:sp>
@@ -1621,19 +1776,17 @@
           </a:prstGeom>
         </p:spPr>
         <p:txBody>
-          <a:bodyPr lIns="0" rIns="0" tIns="0" bIns="0">
+          <a:bodyPr lIns="0" tIns="0" rIns="0" bIns="0">
             <a:noAutofit/>
           </a:bodyPr>
+          <a:lstStyle/>
           <a:p>
             <a:r>
-              <a:rPr b="0" lang="pt-BR" sz="1400" spc="-1" strike="noStrike">
+              <a:rPr lang="pt-BR" sz="1400" b="0" strike="noStrike" spc="-1">
                 <a:latin typeface="Times New Roman"/>
               </a:rPr>
               <a:t>&lt;data/hora&gt;</a:t>
             </a:r>
-            <a:endParaRPr b="0" lang="pt-BR" sz="1400" spc="-1" strike="noStrike">
-              <a:latin typeface="Times New Roman"/>
-            </a:endParaRPr>
           </a:p>
         </p:txBody>
       </p:sp>
@@ -1657,20 +1810,18 @@
           </a:prstGeom>
         </p:spPr>
         <p:txBody>
-          <a:bodyPr lIns="0" rIns="0" tIns="0" bIns="0">
+          <a:bodyPr lIns="0" tIns="0" rIns="0" bIns="0">
             <a:noAutofit/>
           </a:bodyPr>
+          <a:lstStyle/>
           <a:p>
             <a:pPr algn="ctr"/>
             <a:r>
-              <a:rPr b="0" lang="pt-BR" sz="1400" spc="-1" strike="noStrike">
+              <a:rPr lang="pt-BR" sz="1400" b="0" strike="noStrike" spc="-1">
                 <a:latin typeface="Times New Roman"/>
               </a:rPr>
               <a:t>&lt;rodapé&gt;</a:t>
             </a:r>
-            <a:endParaRPr b="0" lang="pt-BR" sz="1400" spc="-1" strike="noStrike">
-              <a:latin typeface="Times New Roman"/>
-            </a:endParaRPr>
           </a:p>
         </p:txBody>
       </p:sp>
@@ -1694,18 +1845,19 @@
           </a:prstGeom>
         </p:spPr>
         <p:txBody>
-          <a:bodyPr lIns="0" rIns="0" tIns="0" bIns="0">
+          <a:bodyPr lIns="0" tIns="0" rIns="0" bIns="0">
             <a:noAutofit/>
           </a:bodyPr>
+          <a:lstStyle/>
           <a:p>
             <a:pPr algn="r"/>
             <a:fld id="{38546DC2-5407-4E1E-B0AE-62D8BDF8F817}" type="slidenum">
-              <a:rPr b="0" lang="pt-BR" sz="1400" spc="-1" strike="noStrike">
+              <a:rPr lang="pt-BR" sz="1400" b="0" strike="noStrike" spc="-1">
                 <a:latin typeface="Times New Roman"/>
               </a:rPr>
-              <a:t>&lt;número&gt;</a:t>
+              <a:t>‹nº›</a:t>
             </a:fld>
-            <a:endParaRPr b="0" lang="pt-BR" sz="1400" spc="-1" strike="noStrike">
+            <a:endParaRPr lang="pt-BR" sz="1400" b="0" strike="noStrike" spc="-1">
               <a:latin typeface="Times New Roman"/>
             </a:endParaRPr>
           </a:p>
@@ -1713,27 +1865,315 @@
       </p:sp>
     </p:spTree>
   </p:cSld>
-  <p:clrMap bg1="lt1" bg2="lt2" tx1="dk1" tx2="dk2" accent1="accent1" accent2="accent2" accent3="accent3" accent4="accent4" accent5="accent5" accent6="accent6" hlink="hlink" folHlink="folHlink"/>
+  <p:clrMap bg1="lt1" tx1="dk1" bg2="lt2" tx2="dk2" accent1="accent1" accent2="accent2" accent3="accent3" accent4="accent4" accent5="accent5" accent6="accent6" hlink="hlink" folHlink="folHlink"/>
   <p:sldLayoutIdLst>
-    <p:sldLayoutId id="2147483649" r:id="rId2"/>
-    <p:sldLayoutId id="2147483650" r:id="rId3"/>
-    <p:sldLayoutId id="2147483651" r:id="rId4"/>
-    <p:sldLayoutId id="2147483652" r:id="rId5"/>
-    <p:sldLayoutId id="2147483653" r:id="rId6"/>
-    <p:sldLayoutId id="2147483654" r:id="rId7"/>
-    <p:sldLayoutId id="2147483655" r:id="rId8"/>
-    <p:sldLayoutId id="2147483656" r:id="rId9"/>
-    <p:sldLayoutId id="2147483657" r:id="rId10"/>
-    <p:sldLayoutId id="2147483658" r:id="rId11"/>
-    <p:sldLayoutId id="2147483659" r:id="rId12"/>
-    <p:sldLayoutId id="2147483660" r:id="rId13"/>
+    <p:sldLayoutId id="2147483649" r:id="rId1"/>
+    <p:sldLayoutId id="2147483650" r:id="rId2"/>
+    <p:sldLayoutId id="2147483651" r:id="rId3"/>
+    <p:sldLayoutId id="2147483652" r:id="rId4"/>
+    <p:sldLayoutId id="2147483653" r:id="rId5"/>
+    <p:sldLayoutId id="2147483654" r:id="rId6"/>
+    <p:sldLayoutId id="2147483655" r:id="rId7"/>
+    <p:sldLayoutId id="2147483656" r:id="rId8"/>
+    <p:sldLayoutId id="2147483657" r:id="rId9"/>
+    <p:sldLayoutId id="2147483658" r:id="rId10"/>
+    <p:sldLayoutId id="2147483659" r:id="rId11"/>
+    <p:sldLayoutId id="2147483660" r:id="rId12"/>
   </p:sldLayoutIdLst>
+  <p:txStyles>
+    <p:titleStyle>
+      <a:lvl1pPr algn="l" defTabSz="914400" rtl="0" eaLnBrk="1" latinLnBrk="0" hangingPunct="1">
+        <a:lnSpc>
+          <a:spcPct val="90000"/>
+        </a:lnSpc>
+        <a:spcBef>
+          <a:spcPct val="0"/>
+        </a:spcBef>
+        <a:buNone/>
+        <a:defRPr sz="4400" kern="1200">
+          <a:solidFill>
+            <a:schemeClr val="tx1"/>
+          </a:solidFill>
+          <a:latin typeface="+mj-lt"/>
+          <a:ea typeface="+mj-ea"/>
+          <a:cs typeface="+mj-cs"/>
+        </a:defRPr>
+      </a:lvl1pPr>
+    </p:titleStyle>
+    <p:bodyStyle>
+      <a:lvl1pPr marL="228600" indent="-228600" algn="l" defTabSz="914400" rtl="0" eaLnBrk="1" latinLnBrk="0" hangingPunct="1">
+        <a:lnSpc>
+          <a:spcPct val="90000"/>
+        </a:lnSpc>
+        <a:spcBef>
+          <a:spcPts val="1000"/>
+        </a:spcBef>
+        <a:buFont typeface="Arial" panose="020B0604020202020204" pitchFamily="34" charset="0"/>
+        <a:buChar char="•"/>
+        <a:defRPr sz="2800" kern="1200">
+          <a:solidFill>
+            <a:schemeClr val="tx1"/>
+          </a:solidFill>
+          <a:latin typeface="+mn-lt"/>
+          <a:ea typeface="+mn-ea"/>
+          <a:cs typeface="+mn-cs"/>
+        </a:defRPr>
+      </a:lvl1pPr>
+      <a:lvl2pPr marL="685800" indent="-228600" algn="l" defTabSz="914400" rtl="0" eaLnBrk="1" latinLnBrk="0" hangingPunct="1">
+        <a:lnSpc>
+          <a:spcPct val="90000"/>
+        </a:lnSpc>
+        <a:spcBef>
+          <a:spcPts val="500"/>
+        </a:spcBef>
+        <a:buFont typeface="Arial" panose="020B0604020202020204" pitchFamily="34" charset="0"/>
+        <a:buChar char="•"/>
+        <a:defRPr sz="2400" kern="1200">
+          <a:solidFill>
+            <a:schemeClr val="tx1"/>
+          </a:solidFill>
+          <a:latin typeface="+mn-lt"/>
+          <a:ea typeface="+mn-ea"/>
+          <a:cs typeface="+mn-cs"/>
+        </a:defRPr>
+      </a:lvl2pPr>
+      <a:lvl3pPr marL="1143000" indent="-228600" algn="l" defTabSz="914400" rtl="0" eaLnBrk="1" latinLnBrk="0" hangingPunct="1">
+        <a:lnSpc>
+          <a:spcPct val="90000"/>
+        </a:lnSpc>
+        <a:spcBef>
+          <a:spcPts val="500"/>
+        </a:spcBef>
+        <a:buFont typeface="Arial" panose="020B0604020202020204" pitchFamily="34" charset="0"/>
+        <a:buChar char="•"/>
+        <a:defRPr sz="2000" kern="1200">
+          <a:solidFill>
+            <a:schemeClr val="tx1"/>
+          </a:solidFill>
+          <a:latin typeface="+mn-lt"/>
+          <a:ea typeface="+mn-ea"/>
+          <a:cs typeface="+mn-cs"/>
+        </a:defRPr>
+      </a:lvl3pPr>
+      <a:lvl4pPr marL="1600200" indent="-228600" algn="l" defTabSz="914400" rtl="0" eaLnBrk="1" latinLnBrk="0" hangingPunct="1">
+        <a:lnSpc>
+          <a:spcPct val="90000"/>
+        </a:lnSpc>
+        <a:spcBef>
+          <a:spcPts val="500"/>
+        </a:spcBef>
+        <a:buFont typeface="Arial" panose="020B0604020202020204" pitchFamily="34" charset="0"/>
+        <a:buChar char="•"/>
+        <a:defRPr sz="1800" kern="1200">
+          <a:solidFill>
+            <a:schemeClr val="tx1"/>
+          </a:solidFill>
+          <a:latin typeface="+mn-lt"/>
+          <a:ea typeface="+mn-ea"/>
+          <a:cs typeface="+mn-cs"/>
+        </a:defRPr>
+      </a:lvl4pPr>
+      <a:lvl5pPr marL="2057400" indent="-228600" algn="l" defTabSz="914400" rtl="0" eaLnBrk="1" latinLnBrk="0" hangingPunct="1">
+        <a:lnSpc>
+          <a:spcPct val="90000"/>
+        </a:lnSpc>
+        <a:spcBef>
+          <a:spcPts val="500"/>
+        </a:spcBef>
+        <a:buFont typeface="Arial" panose="020B0604020202020204" pitchFamily="34" charset="0"/>
+        <a:buChar char="•"/>
+        <a:defRPr sz="1800" kern="1200">
+          <a:solidFill>
+            <a:schemeClr val="tx1"/>
+          </a:solidFill>
+          <a:latin typeface="+mn-lt"/>
+          <a:ea typeface="+mn-ea"/>
+          <a:cs typeface="+mn-cs"/>
+        </a:defRPr>
+      </a:lvl5pPr>
+      <a:lvl6pPr marL="2514600" indent="-228600" algn="l" defTabSz="914400" rtl="0" eaLnBrk="1" latinLnBrk="0" hangingPunct="1">
+        <a:lnSpc>
+          <a:spcPct val="90000"/>
+        </a:lnSpc>
+        <a:spcBef>
+          <a:spcPts val="500"/>
+        </a:spcBef>
+        <a:buFont typeface="Arial" panose="020B0604020202020204" pitchFamily="34" charset="0"/>
+        <a:buChar char="•"/>
+        <a:defRPr sz="1800" kern="1200">
+          <a:solidFill>
+            <a:schemeClr val="tx1"/>
+          </a:solidFill>
+          <a:latin typeface="+mn-lt"/>
+          <a:ea typeface="+mn-ea"/>
+          <a:cs typeface="+mn-cs"/>
+        </a:defRPr>
+      </a:lvl6pPr>
+      <a:lvl7pPr marL="2971800" indent="-228600" algn="l" defTabSz="914400" rtl="0" eaLnBrk="1" latinLnBrk="0" hangingPunct="1">
+        <a:lnSpc>
+          <a:spcPct val="90000"/>
+        </a:lnSpc>
+        <a:spcBef>
+          <a:spcPts val="500"/>
+        </a:spcBef>
+        <a:buFont typeface="Arial" panose="020B0604020202020204" pitchFamily="34" charset="0"/>
+        <a:buChar char="•"/>
+        <a:defRPr sz="1800" kern="1200">
+          <a:solidFill>
+            <a:schemeClr val="tx1"/>
+          </a:solidFill>
+          <a:latin typeface="+mn-lt"/>
+          <a:ea typeface="+mn-ea"/>
+          <a:cs typeface="+mn-cs"/>
+        </a:defRPr>
+      </a:lvl7pPr>
+      <a:lvl8pPr marL="3429000" indent="-228600" algn="l" defTabSz="914400" rtl="0" eaLnBrk="1" latinLnBrk="0" hangingPunct="1">
+        <a:lnSpc>
+          <a:spcPct val="90000"/>
+        </a:lnSpc>
+        <a:spcBef>
+          <a:spcPts val="500"/>
+        </a:spcBef>
+        <a:buFont typeface="Arial" panose="020B0604020202020204" pitchFamily="34" charset="0"/>
+        <a:buChar char="•"/>
+        <a:defRPr sz="1800" kern="1200">
+          <a:solidFill>
+            <a:schemeClr val="tx1"/>
+          </a:solidFill>
+          <a:latin typeface="+mn-lt"/>
+          <a:ea typeface="+mn-ea"/>
+          <a:cs typeface="+mn-cs"/>
+        </a:defRPr>
+      </a:lvl8pPr>
+      <a:lvl9pPr marL="3886200" indent="-228600" algn="l" defTabSz="914400" rtl="0" eaLnBrk="1" latinLnBrk="0" hangingPunct="1">
+        <a:lnSpc>
+          <a:spcPct val="90000"/>
+        </a:lnSpc>
+        <a:spcBef>
+          <a:spcPts val="500"/>
+        </a:spcBef>
+        <a:buFont typeface="Arial" panose="020B0604020202020204" pitchFamily="34" charset="0"/>
+        <a:buChar char="•"/>
+        <a:defRPr sz="1800" kern="1200">
+          <a:solidFill>
+            <a:schemeClr val="tx1"/>
+          </a:solidFill>
+          <a:latin typeface="+mn-lt"/>
+          <a:ea typeface="+mn-ea"/>
+          <a:cs typeface="+mn-cs"/>
+        </a:defRPr>
+      </a:lvl9pPr>
+    </p:bodyStyle>
+    <p:otherStyle>
+      <a:defPPr>
+        <a:defRPr lang="pt-BR"/>
+      </a:defPPr>
+      <a:lvl1pPr marL="0" algn="l" defTabSz="914400" rtl="0" eaLnBrk="1" latinLnBrk="0" hangingPunct="1">
+        <a:defRPr sz="1800" kern="1200">
+          <a:solidFill>
+            <a:schemeClr val="tx1"/>
+          </a:solidFill>
+          <a:latin typeface="+mn-lt"/>
+          <a:ea typeface="+mn-ea"/>
+          <a:cs typeface="+mn-cs"/>
+        </a:defRPr>
+      </a:lvl1pPr>
+      <a:lvl2pPr marL="457200" algn="l" defTabSz="914400" rtl="0" eaLnBrk="1" latinLnBrk="0" hangingPunct="1">
+        <a:defRPr sz="1800" kern="1200">
+          <a:solidFill>
+            <a:schemeClr val="tx1"/>
+          </a:solidFill>
+          <a:latin typeface="+mn-lt"/>
+          <a:ea typeface="+mn-ea"/>
+          <a:cs typeface="+mn-cs"/>
+        </a:defRPr>
+      </a:lvl2pPr>
+      <a:lvl3pPr marL="914400" algn="l" defTabSz="914400" rtl="0" eaLnBrk="1" latinLnBrk="0" hangingPunct="1">
+        <a:defRPr sz="1800" kern="1200">
+          <a:solidFill>
+            <a:schemeClr val="tx1"/>
+          </a:solidFill>
+          <a:latin typeface="+mn-lt"/>
+          <a:ea typeface="+mn-ea"/>
+          <a:cs typeface="+mn-cs"/>
+        </a:defRPr>
+      </a:lvl3pPr>
+      <a:lvl4pPr marL="1371600" algn="l" defTabSz="914400" rtl="0" eaLnBrk="1" latinLnBrk="0" hangingPunct="1">
+        <a:defRPr sz="1800" kern="1200">
+          <a:solidFill>
+            <a:schemeClr val="tx1"/>
+          </a:solidFill>
+          <a:latin typeface="+mn-lt"/>
+          <a:ea typeface="+mn-ea"/>
+          <a:cs typeface="+mn-cs"/>
+        </a:defRPr>
+      </a:lvl4pPr>
+      <a:lvl5pPr marL="1828800" algn="l" defTabSz="914400" rtl="0" eaLnBrk="1" latinLnBrk="0" hangingPunct="1">
+        <a:defRPr sz="1800" kern="1200">
+          <a:solidFill>
+            <a:schemeClr val="tx1"/>
+          </a:solidFill>
+          <a:latin typeface="+mn-lt"/>
+          <a:ea typeface="+mn-ea"/>
+          <a:cs typeface="+mn-cs"/>
+        </a:defRPr>
+      </a:lvl5pPr>
+      <a:lvl6pPr marL="2286000" algn="l" defTabSz="914400" rtl="0" eaLnBrk="1" latinLnBrk="0" hangingPunct="1">
+        <a:defRPr sz="1800" kern="1200">
+          <a:solidFill>
+            <a:schemeClr val="tx1"/>
+          </a:solidFill>
+          <a:latin typeface="+mn-lt"/>
+          <a:ea typeface="+mn-ea"/>
+          <a:cs typeface="+mn-cs"/>
+        </a:defRPr>
+      </a:lvl6pPr>
+      <a:lvl7pPr marL="2743200" algn="l" defTabSz="914400" rtl="0" eaLnBrk="1" latinLnBrk="0" hangingPunct="1">
+        <a:defRPr sz="1800" kern="1200">
+          <a:solidFill>
+            <a:schemeClr val="tx1"/>
+          </a:solidFill>
+          <a:latin typeface="+mn-lt"/>
+          <a:ea typeface="+mn-ea"/>
+          <a:cs typeface="+mn-cs"/>
+        </a:defRPr>
+      </a:lvl7pPr>
+      <a:lvl8pPr marL="3200400" algn="l" defTabSz="914400" rtl="0" eaLnBrk="1" latinLnBrk="0" hangingPunct="1">
+        <a:defRPr sz="1800" kern="1200">
+          <a:solidFill>
+            <a:schemeClr val="tx1"/>
+          </a:solidFill>
+          <a:latin typeface="+mn-lt"/>
+          <a:ea typeface="+mn-ea"/>
+          <a:cs typeface="+mn-cs"/>
+        </a:defRPr>
+      </a:lvl8pPr>
+      <a:lvl9pPr marL="3657600" algn="l" defTabSz="914400" rtl="0" eaLnBrk="1" latinLnBrk="0" hangingPunct="1">
+        <a:defRPr sz="1800" kern="1200">
+          <a:solidFill>
+            <a:schemeClr val="tx1"/>
+          </a:solidFill>
+          <a:latin typeface="+mn-lt"/>
+          <a:ea typeface="+mn-ea"/>
+          <a:cs typeface="+mn-cs"/>
+        </a:defRPr>
+      </a:lvl9pPr>
+    </p:otherStyle>
+  </p:txStyles>
 </p:sldMaster>
 </file>
 
 <file path=ppt/slides/slide1.xml><?xml version="1.0" encoding="utf-8"?>
-<p:sld xmlns:a="http://schemas.openxmlformats.org/drawingml/2006/main" xmlns:p="http://schemas.openxmlformats.org/presentationml/2006/main" xmlns:r="http://schemas.openxmlformats.org/officeDocument/2006/relationships" xmlns:p14="http://schemas.microsoft.com/office/powerpoint/2010/main" xmlns:p15="http://schemas.microsoft.com/office/powerpoint/2012/main" xmlns:mc="http://schemas.openxmlformats.org/markup-compatibility/2006">
+<p:sld xmlns:a="http://schemas.openxmlformats.org/drawingml/2006/main" xmlns:r="http://schemas.openxmlformats.org/officeDocument/2006/relationships" xmlns:p="http://schemas.openxmlformats.org/presentationml/2006/main">
   <p:cSld>
+    <p:bg>
+      <p:bgPr>
+        <a:solidFill>
+          <a:srgbClr val="FEFAE0"/>
+        </a:solidFill>
+        <a:effectLst/>
+      </p:bgPr>
+    </p:bg>
     <p:spTree>
       <p:nvGrpSpPr>
         <p:cNvPr id="1" name=""/>
@@ -1748,16 +2188,1993 @@
           <a:chExt cx="0" cy="0"/>
         </a:xfrm>
       </p:grpSpPr>
+      <p:sp>
+        <p:nvSpPr>
+          <p:cNvPr id="2" name="Retângulo 1">
+            <a:extLst>
+              <a:ext uri="{FF2B5EF4-FFF2-40B4-BE49-F238E27FC236}">
+                <a16:creationId xmlns:a16="http://schemas.microsoft.com/office/drawing/2014/main" id="{173F8CD4-59FB-40D9-900D-41A0700F0162}"/>
+              </a:ext>
+            </a:extLst>
+          </p:cNvPr>
+          <p:cNvSpPr/>
+          <p:nvPr/>
+        </p:nvSpPr>
+        <p:spPr>
+          <a:xfrm>
+            <a:off x="1253121" y="1077554"/>
+            <a:ext cx="715379" cy="653172"/>
+          </a:xfrm>
+          <a:prstGeom prst="rect">
+            <a:avLst/>
+          </a:prstGeom>
+          <a:solidFill>
+            <a:srgbClr val="606C38"/>
+          </a:solidFill>
+          <a:ln>
+            <a:solidFill>
+              <a:srgbClr val="606C38"/>
+            </a:solidFill>
+          </a:ln>
+        </p:spPr>
+        <p:style>
+          <a:lnRef idx="2">
+            <a:schemeClr val="accent1">
+              <a:shade val="50000"/>
+            </a:schemeClr>
+          </a:lnRef>
+          <a:fillRef idx="1">
+            <a:schemeClr val="accent1"/>
+          </a:fillRef>
+          <a:effectRef idx="0">
+            <a:schemeClr val="accent1"/>
+          </a:effectRef>
+          <a:fontRef idx="minor">
+            <a:schemeClr val="lt1"/>
+          </a:fontRef>
+        </p:style>
+        <p:txBody>
+          <a:bodyPr rtlCol="0" anchor="ctr"/>
+          <a:lstStyle/>
+          <a:p>
+            <a:pPr algn="ctr"/>
+            <a:endParaRPr lang="pt-BR"/>
+          </a:p>
+        </p:txBody>
+      </p:sp>
+      <p:sp>
+        <p:nvSpPr>
+          <p:cNvPr id="3" name="Retângulo 2">
+            <a:extLst>
+              <a:ext uri="{FF2B5EF4-FFF2-40B4-BE49-F238E27FC236}">
+                <a16:creationId xmlns:a16="http://schemas.microsoft.com/office/drawing/2014/main" id="{C5B6200C-9FF4-2F0B-64F5-678C19BB60BC}"/>
+              </a:ext>
+            </a:extLst>
+          </p:cNvPr>
+          <p:cNvSpPr/>
+          <p:nvPr/>
+        </p:nvSpPr>
+        <p:spPr>
+          <a:xfrm>
+            <a:off x="1253121" y="1777974"/>
+            <a:ext cx="715379" cy="653172"/>
+          </a:xfrm>
+          <a:prstGeom prst="rect">
+            <a:avLst/>
+          </a:prstGeom>
+          <a:solidFill>
+            <a:srgbClr val="283618"/>
+          </a:solidFill>
+          <a:ln>
+            <a:solidFill>
+              <a:srgbClr val="283618"/>
+            </a:solidFill>
+          </a:ln>
+        </p:spPr>
+        <p:style>
+          <a:lnRef idx="2">
+            <a:schemeClr val="accent1">
+              <a:shade val="50000"/>
+            </a:schemeClr>
+          </a:lnRef>
+          <a:fillRef idx="1">
+            <a:schemeClr val="accent1"/>
+          </a:fillRef>
+          <a:effectRef idx="0">
+            <a:schemeClr val="accent1"/>
+          </a:effectRef>
+          <a:fontRef idx="minor">
+            <a:schemeClr val="lt1"/>
+          </a:fontRef>
+        </p:style>
+        <p:txBody>
+          <a:bodyPr rtlCol="0" anchor="ctr"/>
+          <a:lstStyle/>
+          <a:p>
+            <a:pPr algn="ctr"/>
+            <a:endParaRPr lang="pt-BR"/>
+          </a:p>
+        </p:txBody>
+      </p:sp>
+      <p:sp>
+        <p:nvSpPr>
+          <p:cNvPr id="4" name="Retângulo 3">
+            <a:extLst>
+              <a:ext uri="{FF2B5EF4-FFF2-40B4-BE49-F238E27FC236}">
+                <a16:creationId xmlns:a16="http://schemas.microsoft.com/office/drawing/2014/main" id="{F9BCFF39-0484-9628-91EC-0EC77D6C1D0E}"/>
+              </a:ext>
+            </a:extLst>
+          </p:cNvPr>
+          <p:cNvSpPr/>
+          <p:nvPr/>
+        </p:nvSpPr>
+        <p:spPr>
+          <a:xfrm>
+            <a:off x="1253121" y="2477138"/>
+            <a:ext cx="715379" cy="653172"/>
+          </a:xfrm>
+          <a:prstGeom prst="rect">
+            <a:avLst/>
+          </a:prstGeom>
+          <a:solidFill>
+            <a:srgbClr val="DDA15E"/>
+          </a:solidFill>
+          <a:ln>
+            <a:solidFill>
+              <a:srgbClr val="DDA15E"/>
+            </a:solidFill>
+          </a:ln>
+        </p:spPr>
+        <p:style>
+          <a:lnRef idx="2">
+            <a:schemeClr val="accent1">
+              <a:shade val="50000"/>
+            </a:schemeClr>
+          </a:lnRef>
+          <a:fillRef idx="1">
+            <a:schemeClr val="accent1"/>
+          </a:fillRef>
+          <a:effectRef idx="0">
+            <a:schemeClr val="accent1"/>
+          </a:effectRef>
+          <a:fontRef idx="minor">
+            <a:schemeClr val="lt1"/>
+          </a:fontRef>
+        </p:style>
+        <p:txBody>
+          <a:bodyPr rtlCol="0" anchor="ctr"/>
+          <a:lstStyle/>
+          <a:p>
+            <a:pPr algn="ctr"/>
+            <a:endParaRPr lang="pt-BR"/>
+          </a:p>
+        </p:txBody>
+      </p:sp>
+      <p:sp>
+        <p:nvSpPr>
+          <p:cNvPr id="5" name="Retângulo 4">
+            <a:extLst>
+              <a:ext uri="{FF2B5EF4-FFF2-40B4-BE49-F238E27FC236}">
+                <a16:creationId xmlns:a16="http://schemas.microsoft.com/office/drawing/2014/main" id="{1466F4C9-4FBC-398F-F7D5-3885DBB60B93}"/>
+              </a:ext>
+            </a:extLst>
+          </p:cNvPr>
+          <p:cNvSpPr/>
+          <p:nvPr/>
+        </p:nvSpPr>
+        <p:spPr>
+          <a:xfrm>
+            <a:off x="4700311" y="1077554"/>
+            <a:ext cx="715379" cy="653172"/>
+          </a:xfrm>
+          <a:prstGeom prst="rect">
+            <a:avLst/>
+          </a:prstGeom>
+          <a:solidFill>
+            <a:srgbClr val="606C38"/>
+          </a:solidFill>
+          <a:ln>
+            <a:solidFill>
+              <a:srgbClr val="606C38"/>
+            </a:solidFill>
+          </a:ln>
+        </p:spPr>
+        <p:style>
+          <a:lnRef idx="2">
+            <a:schemeClr val="accent1">
+              <a:shade val="50000"/>
+            </a:schemeClr>
+          </a:lnRef>
+          <a:fillRef idx="1">
+            <a:schemeClr val="accent1"/>
+          </a:fillRef>
+          <a:effectRef idx="0">
+            <a:schemeClr val="accent1"/>
+          </a:effectRef>
+          <a:fontRef idx="minor">
+            <a:schemeClr val="lt1"/>
+          </a:fontRef>
+        </p:style>
+        <p:txBody>
+          <a:bodyPr rtlCol="0" anchor="ctr"/>
+          <a:lstStyle/>
+          <a:p>
+            <a:pPr algn="ctr"/>
+            <a:endParaRPr lang="pt-BR"/>
+          </a:p>
+        </p:txBody>
+      </p:sp>
+      <p:sp>
+        <p:nvSpPr>
+          <p:cNvPr id="6" name="Retângulo 5">
+            <a:extLst>
+              <a:ext uri="{FF2B5EF4-FFF2-40B4-BE49-F238E27FC236}">
+                <a16:creationId xmlns:a16="http://schemas.microsoft.com/office/drawing/2014/main" id="{D602CAAC-618F-559C-4BE7-4C0DE7D216F6}"/>
+              </a:ext>
+            </a:extLst>
+          </p:cNvPr>
+          <p:cNvSpPr/>
+          <p:nvPr/>
+        </p:nvSpPr>
+        <p:spPr>
+          <a:xfrm>
+            <a:off x="4700311" y="1777974"/>
+            <a:ext cx="715379" cy="653172"/>
+          </a:xfrm>
+          <a:prstGeom prst="rect">
+            <a:avLst/>
+          </a:prstGeom>
+          <a:solidFill>
+            <a:srgbClr val="283618"/>
+          </a:solidFill>
+          <a:ln>
+            <a:solidFill>
+              <a:srgbClr val="283618"/>
+            </a:solidFill>
+          </a:ln>
+        </p:spPr>
+        <p:style>
+          <a:lnRef idx="2">
+            <a:schemeClr val="accent1">
+              <a:shade val="50000"/>
+            </a:schemeClr>
+          </a:lnRef>
+          <a:fillRef idx="1">
+            <a:schemeClr val="accent1"/>
+          </a:fillRef>
+          <a:effectRef idx="0">
+            <a:schemeClr val="accent1"/>
+          </a:effectRef>
+          <a:fontRef idx="minor">
+            <a:schemeClr val="lt1"/>
+          </a:fontRef>
+        </p:style>
+        <p:txBody>
+          <a:bodyPr rtlCol="0" anchor="ctr"/>
+          <a:lstStyle/>
+          <a:p>
+            <a:pPr algn="ctr"/>
+            <a:endParaRPr lang="pt-BR"/>
+          </a:p>
+        </p:txBody>
+      </p:sp>
+      <p:sp>
+        <p:nvSpPr>
+          <p:cNvPr id="7" name="Retângulo 6">
+            <a:extLst>
+              <a:ext uri="{FF2B5EF4-FFF2-40B4-BE49-F238E27FC236}">
+                <a16:creationId xmlns:a16="http://schemas.microsoft.com/office/drawing/2014/main" id="{A3FFFE2F-8683-B048-496D-0EC5EFDDDDA4}"/>
+              </a:ext>
+            </a:extLst>
+          </p:cNvPr>
+          <p:cNvSpPr/>
+          <p:nvPr/>
+        </p:nvSpPr>
+        <p:spPr>
+          <a:xfrm>
+            <a:off x="4700311" y="2477138"/>
+            <a:ext cx="715379" cy="653172"/>
+          </a:xfrm>
+          <a:prstGeom prst="rect">
+            <a:avLst/>
+          </a:prstGeom>
+          <a:solidFill>
+            <a:srgbClr val="283618"/>
+          </a:solidFill>
+          <a:ln>
+            <a:solidFill>
+              <a:srgbClr val="283618"/>
+            </a:solidFill>
+          </a:ln>
+        </p:spPr>
+        <p:style>
+          <a:lnRef idx="2">
+            <a:schemeClr val="accent1">
+              <a:shade val="50000"/>
+            </a:schemeClr>
+          </a:lnRef>
+          <a:fillRef idx="1">
+            <a:schemeClr val="accent1"/>
+          </a:fillRef>
+          <a:effectRef idx="0">
+            <a:schemeClr val="accent1"/>
+          </a:effectRef>
+          <a:fontRef idx="minor">
+            <a:schemeClr val="lt1"/>
+          </a:fontRef>
+        </p:style>
+        <p:txBody>
+          <a:bodyPr rtlCol="0" anchor="ctr"/>
+          <a:lstStyle/>
+          <a:p>
+            <a:pPr algn="ctr"/>
+            <a:endParaRPr lang="pt-BR"/>
+          </a:p>
+        </p:txBody>
+      </p:sp>
+      <p:sp>
+        <p:nvSpPr>
+          <p:cNvPr id="8" name="Retângulo 7">
+            <a:extLst>
+              <a:ext uri="{FF2B5EF4-FFF2-40B4-BE49-F238E27FC236}">
+                <a16:creationId xmlns:a16="http://schemas.microsoft.com/office/drawing/2014/main" id="{D35FDCF7-C6D0-B0CD-F6DD-63124BDF1BA1}"/>
+              </a:ext>
+            </a:extLst>
+          </p:cNvPr>
+          <p:cNvSpPr/>
+          <p:nvPr/>
+        </p:nvSpPr>
+        <p:spPr>
+          <a:xfrm>
+            <a:off x="4700311" y="3183681"/>
+            <a:ext cx="715379" cy="653172"/>
+          </a:xfrm>
+          <a:prstGeom prst="rect">
+            <a:avLst/>
+          </a:prstGeom>
+          <a:solidFill>
+            <a:srgbClr val="283618"/>
+          </a:solidFill>
+          <a:ln>
+            <a:solidFill>
+              <a:srgbClr val="283618"/>
+            </a:solidFill>
+          </a:ln>
+        </p:spPr>
+        <p:style>
+          <a:lnRef idx="2">
+            <a:schemeClr val="accent1">
+              <a:shade val="50000"/>
+            </a:schemeClr>
+          </a:lnRef>
+          <a:fillRef idx="1">
+            <a:schemeClr val="accent1"/>
+          </a:fillRef>
+          <a:effectRef idx="0">
+            <a:schemeClr val="accent1"/>
+          </a:effectRef>
+          <a:fontRef idx="minor">
+            <a:schemeClr val="lt1"/>
+          </a:fontRef>
+        </p:style>
+        <p:txBody>
+          <a:bodyPr rtlCol="0" anchor="ctr"/>
+          <a:lstStyle/>
+          <a:p>
+            <a:pPr algn="ctr"/>
+            <a:endParaRPr lang="pt-BR"/>
+          </a:p>
+        </p:txBody>
+      </p:sp>
+      <p:sp>
+        <p:nvSpPr>
+          <p:cNvPr id="9" name="Retângulo 8">
+            <a:extLst>
+              <a:ext uri="{FF2B5EF4-FFF2-40B4-BE49-F238E27FC236}">
+                <a16:creationId xmlns:a16="http://schemas.microsoft.com/office/drawing/2014/main" id="{C82D59CC-9B5D-6E3D-36B4-7B75FE9F4373}"/>
+              </a:ext>
+            </a:extLst>
+          </p:cNvPr>
+          <p:cNvSpPr/>
+          <p:nvPr/>
+        </p:nvSpPr>
+        <p:spPr>
+          <a:xfrm>
+            <a:off x="4700310" y="3887985"/>
+            <a:ext cx="715379" cy="653172"/>
+          </a:xfrm>
+          <a:prstGeom prst="rect">
+            <a:avLst/>
+          </a:prstGeom>
+          <a:solidFill>
+            <a:srgbClr val="BC6C25"/>
+          </a:solidFill>
+          <a:ln>
+            <a:solidFill>
+              <a:srgbClr val="BC6C25"/>
+            </a:solidFill>
+          </a:ln>
+        </p:spPr>
+        <p:style>
+          <a:lnRef idx="2">
+            <a:schemeClr val="accent1">
+              <a:shade val="50000"/>
+            </a:schemeClr>
+          </a:lnRef>
+          <a:fillRef idx="1">
+            <a:schemeClr val="accent1"/>
+          </a:fillRef>
+          <a:effectRef idx="0">
+            <a:schemeClr val="accent1"/>
+          </a:effectRef>
+          <a:fontRef idx="minor">
+            <a:schemeClr val="lt1"/>
+          </a:fontRef>
+        </p:style>
+        <p:txBody>
+          <a:bodyPr rtlCol="0" anchor="ctr"/>
+          <a:lstStyle/>
+          <a:p>
+            <a:pPr algn="ctr"/>
+            <a:endParaRPr lang="pt-BR"/>
+          </a:p>
+        </p:txBody>
+      </p:sp>
+      <p:sp>
+        <p:nvSpPr>
+          <p:cNvPr id="10" name="Elipse 9">
+            <a:extLst>
+              <a:ext uri="{FF2B5EF4-FFF2-40B4-BE49-F238E27FC236}">
+                <a16:creationId xmlns:a16="http://schemas.microsoft.com/office/drawing/2014/main" id="{6763EB12-D920-1FDB-BDEF-B9B15E532EF6}"/>
+              </a:ext>
+            </a:extLst>
+          </p:cNvPr>
+          <p:cNvSpPr/>
+          <p:nvPr/>
+        </p:nvSpPr>
+        <p:spPr>
+          <a:xfrm>
+            <a:off x="4245444" y="1328297"/>
+            <a:ext cx="129553" cy="129553"/>
+          </a:xfrm>
+          <a:prstGeom prst="ellipse">
+            <a:avLst/>
+          </a:prstGeom>
+          <a:solidFill>
+            <a:srgbClr val="606C38"/>
+          </a:solidFill>
+          <a:ln>
+            <a:solidFill>
+              <a:srgbClr val="606C38"/>
+            </a:solidFill>
+          </a:ln>
+        </p:spPr>
+        <p:style>
+          <a:lnRef idx="2">
+            <a:schemeClr val="accent1">
+              <a:shade val="50000"/>
+            </a:schemeClr>
+          </a:lnRef>
+          <a:fillRef idx="1">
+            <a:schemeClr val="accent1"/>
+          </a:fillRef>
+          <a:effectRef idx="0">
+            <a:schemeClr val="accent1"/>
+          </a:effectRef>
+          <a:fontRef idx="minor">
+            <a:schemeClr val="lt1"/>
+          </a:fontRef>
+        </p:style>
+        <p:txBody>
+          <a:bodyPr rtlCol="0" anchor="ctr"/>
+          <a:lstStyle/>
+          <a:p>
+            <a:pPr algn="ctr"/>
+            <a:endParaRPr lang="pt-BR"/>
+          </a:p>
+        </p:txBody>
+      </p:sp>
+      <p:sp>
+        <p:nvSpPr>
+          <p:cNvPr id="11" name="Elipse 10">
+            <a:extLst>
+              <a:ext uri="{FF2B5EF4-FFF2-40B4-BE49-F238E27FC236}">
+                <a16:creationId xmlns:a16="http://schemas.microsoft.com/office/drawing/2014/main" id="{3E952F62-EDAF-5451-E5EA-6F99E5AAC50C}"/>
+              </a:ext>
+            </a:extLst>
+          </p:cNvPr>
+          <p:cNvSpPr/>
+          <p:nvPr/>
+        </p:nvSpPr>
+        <p:spPr>
+          <a:xfrm>
+            <a:off x="2385209" y="1339363"/>
+            <a:ext cx="129553" cy="129553"/>
+          </a:xfrm>
+          <a:prstGeom prst="ellipse">
+            <a:avLst/>
+          </a:prstGeom>
+          <a:solidFill>
+            <a:srgbClr val="606C38"/>
+          </a:solidFill>
+          <a:ln>
+            <a:solidFill>
+              <a:srgbClr val="606C38"/>
+            </a:solidFill>
+          </a:ln>
+        </p:spPr>
+        <p:style>
+          <a:lnRef idx="2">
+            <a:schemeClr val="accent1">
+              <a:shade val="50000"/>
+            </a:schemeClr>
+          </a:lnRef>
+          <a:fillRef idx="1">
+            <a:schemeClr val="accent1"/>
+          </a:fillRef>
+          <a:effectRef idx="0">
+            <a:schemeClr val="accent1"/>
+          </a:effectRef>
+          <a:fontRef idx="minor">
+            <a:schemeClr val="lt1"/>
+          </a:fontRef>
+        </p:style>
+        <p:txBody>
+          <a:bodyPr rtlCol="0" anchor="ctr"/>
+          <a:lstStyle/>
+          <a:p>
+            <a:pPr algn="ctr"/>
+            <a:endParaRPr lang="pt-BR"/>
+          </a:p>
+        </p:txBody>
+      </p:sp>
+      <p:sp>
+        <p:nvSpPr>
+          <p:cNvPr id="12" name="Elipse 11">
+            <a:extLst>
+              <a:ext uri="{FF2B5EF4-FFF2-40B4-BE49-F238E27FC236}">
+                <a16:creationId xmlns:a16="http://schemas.microsoft.com/office/drawing/2014/main" id="{F406772C-BDAA-3235-B413-8E02B10E05F1}"/>
+              </a:ext>
+            </a:extLst>
+          </p:cNvPr>
+          <p:cNvSpPr/>
+          <p:nvPr/>
+        </p:nvSpPr>
+        <p:spPr>
+          <a:xfrm>
+            <a:off x="2385208" y="2039783"/>
+            <a:ext cx="129553" cy="129553"/>
+          </a:xfrm>
+          <a:prstGeom prst="ellipse">
+            <a:avLst/>
+          </a:prstGeom>
+          <a:solidFill>
+            <a:srgbClr val="283618"/>
+          </a:solidFill>
+          <a:ln>
+            <a:solidFill>
+              <a:srgbClr val="283618"/>
+            </a:solidFill>
+          </a:ln>
+        </p:spPr>
+        <p:style>
+          <a:lnRef idx="2">
+            <a:schemeClr val="accent1">
+              <a:shade val="50000"/>
+            </a:schemeClr>
+          </a:lnRef>
+          <a:fillRef idx="1">
+            <a:schemeClr val="accent1"/>
+          </a:fillRef>
+          <a:effectRef idx="0">
+            <a:schemeClr val="accent1"/>
+          </a:effectRef>
+          <a:fontRef idx="minor">
+            <a:schemeClr val="lt1"/>
+          </a:fontRef>
+        </p:style>
+        <p:txBody>
+          <a:bodyPr rtlCol="0" anchor="ctr"/>
+          <a:lstStyle/>
+          <a:p>
+            <a:pPr algn="ctr"/>
+            <a:endParaRPr lang="pt-BR"/>
+          </a:p>
+        </p:txBody>
+      </p:sp>
+      <p:sp>
+        <p:nvSpPr>
+          <p:cNvPr id="13" name="Elipse 12">
+            <a:extLst>
+              <a:ext uri="{FF2B5EF4-FFF2-40B4-BE49-F238E27FC236}">
+                <a16:creationId xmlns:a16="http://schemas.microsoft.com/office/drawing/2014/main" id="{3433867D-710F-D56C-D3AE-44DA79C00ECA}"/>
+              </a:ext>
+            </a:extLst>
+          </p:cNvPr>
+          <p:cNvSpPr/>
+          <p:nvPr/>
+        </p:nvSpPr>
+        <p:spPr>
+          <a:xfrm>
+            <a:off x="4245234" y="2039783"/>
+            <a:ext cx="129553" cy="129553"/>
+          </a:xfrm>
+          <a:prstGeom prst="ellipse">
+            <a:avLst/>
+          </a:prstGeom>
+          <a:solidFill>
+            <a:srgbClr val="283618"/>
+          </a:solidFill>
+          <a:ln>
+            <a:solidFill>
+              <a:srgbClr val="283618"/>
+            </a:solidFill>
+          </a:ln>
+        </p:spPr>
+        <p:style>
+          <a:lnRef idx="2">
+            <a:schemeClr val="accent1">
+              <a:shade val="50000"/>
+            </a:schemeClr>
+          </a:lnRef>
+          <a:fillRef idx="1">
+            <a:schemeClr val="accent1"/>
+          </a:fillRef>
+          <a:effectRef idx="0">
+            <a:schemeClr val="accent1"/>
+          </a:effectRef>
+          <a:fontRef idx="minor">
+            <a:schemeClr val="lt1"/>
+          </a:fontRef>
+        </p:style>
+        <p:txBody>
+          <a:bodyPr rtlCol="0" anchor="ctr"/>
+          <a:lstStyle/>
+          <a:p>
+            <a:pPr algn="ctr"/>
+            <a:endParaRPr lang="pt-BR"/>
+          </a:p>
+        </p:txBody>
+      </p:sp>
+      <p:sp>
+        <p:nvSpPr>
+          <p:cNvPr id="14" name="Elipse 13">
+            <a:extLst>
+              <a:ext uri="{FF2B5EF4-FFF2-40B4-BE49-F238E27FC236}">
+                <a16:creationId xmlns:a16="http://schemas.microsoft.com/office/drawing/2014/main" id="{42C38CBC-22DE-3E0B-B3F4-2D95DB060459}"/>
+              </a:ext>
+            </a:extLst>
+          </p:cNvPr>
+          <p:cNvSpPr/>
+          <p:nvPr/>
+        </p:nvSpPr>
+        <p:spPr>
+          <a:xfrm>
+            <a:off x="4236697" y="2759279"/>
+            <a:ext cx="129553" cy="129553"/>
+          </a:xfrm>
+          <a:prstGeom prst="ellipse">
+            <a:avLst/>
+          </a:prstGeom>
+          <a:solidFill>
+            <a:srgbClr val="283618"/>
+          </a:solidFill>
+          <a:ln>
+            <a:solidFill>
+              <a:srgbClr val="283618"/>
+            </a:solidFill>
+          </a:ln>
+        </p:spPr>
+        <p:style>
+          <a:lnRef idx="2">
+            <a:schemeClr val="accent1">
+              <a:shade val="50000"/>
+            </a:schemeClr>
+          </a:lnRef>
+          <a:fillRef idx="1">
+            <a:schemeClr val="accent1"/>
+          </a:fillRef>
+          <a:effectRef idx="0">
+            <a:schemeClr val="accent1"/>
+          </a:effectRef>
+          <a:fontRef idx="minor">
+            <a:schemeClr val="lt1"/>
+          </a:fontRef>
+        </p:style>
+        <p:txBody>
+          <a:bodyPr rtlCol="0" anchor="ctr"/>
+          <a:lstStyle/>
+          <a:p>
+            <a:pPr algn="ctr"/>
+            <a:endParaRPr lang="pt-BR"/>
+          </a:p>
+        </p:txBody>
+      </p:sp>
+      <p:sp>
+        <p:nvSpPr>
+          <p:cNvPr id="15" name="Elipse 14">
+            <a:extLst>
+              <a:ext uri="{FF2B5EF4-FFF2-40B4-BE49-F238E27FC236}">
+                <a16:creationId xmlns:a16="http://schemas.microsoft.com/office/drawing/2014/main" id="{4F52A9C2-63E2-EDCF-116B-0E43A182AAD1}"/>
+              </a:ext>
+            </a:extLst>
+          </p:cNvPr>
+          <p:cNvSpPr/>
+          <p:nvPr/>
+        </p:nvSpPr>
+        <p:spPr>
+          <a:xfrm>
+            <a:off x="4243503" y="3504632"/>
+            <a:ext cx="129553" cy="129553"/>
+          </a:xfrm>
+          <a:prstGeom prst="ellipse">
+            <a:avLst/>
+          </a:prstGeom>
+          <a:solidFill>
+            <a:srgbClr val="283618"/>
+          </a:solidFill>
+          <a:ln>
+            <a:solidFill>
+              <a:srgbClr val="283618"/>
+            </a:solidFill>
+          </a:ln>
+        </p:spPr>
+        <p:style>
+          <a:lnRef idx="2">
+            <a:schemeClr val="accent1">
+              <a:shade val="50000"/>
+            </a:schemeClr>
+          </a:lnRef>
+          <a:fillRef idx="1">
+            <a:schemeClr val="accent1"/>
+          </a:fillRef>
+          <a:effectRef idx="0">
+            <a:schemeClr val="accent1"/>
+          </a:effectRef>
+          <a:fontRef idx="minor">
+            <a:schemeClr val="lt1"/>
+          </a:fontRef>
+        </p:style>
+        <p:txBody>
+          <a:bodyPr rtlCol="0" anchor="ctr"/>
+          <a:lstStyle/>
+          <a:p>
+            <a:pPr algn="ctr"/>
+            <a:endParaRPr lang="pt-BR"/>
+          </a:p>
+        </p:txBody>
+      </p:sp>
+      <p:cxnSp>
+        <p:nvCxnSpPr>
+          <p:cNvPr id="17" name="Conector reto 16">
+            <a:extLst>
+              <a:ext uri="{FF2B5EF4-FFF2-40B4-BE49-F238E27FC236}">
+                <a16:creationId xmlns:a16="http://schemas.microsoft.com/office/drawing/2014/main" id="{69EC6DB9-5113-902D-D85F-89BEDDF0B0AF}"/>
+              </a:ext>
+            </a:extLst>
+          </p:cNvPr>
+          <p:cNvCxnSpPr>
+            <a:cxnSpLocks/>
+            <a:stCxn id="11" idx="6"/>
+            <a:endCxn id="10" idx="2"/>
+          </p:cNvCxnSpPr>
+          <p:nvPr/>
+        </p:nvCxnSpPr>
+        <p:spPr>
+          <a:xfrm flipV="1">
+            <a:off x="2514762" y="1393074"/>
+            <a:ext cx="1730682" cy="11066"/>
+          </a:xfrm>
+          <a:prstGeom prst="line">
+            <a:avLst/>
+          </a:prstGeom>
+          <a:ln w="57150">
+            <a:solidFill>
+              <a:srgbClr val="606C38"/>
+            </a:solidFill>
+          </a:ln>
+        </p:spPr>
+        <p:style>
+          <a:lnRef idx="1">
+            <a:schemeClr val="accent1"/>
+          </a:lnRef>
+          <a:fillRef idx="0">
+            <a:schemeClr val="accent1"/>
+          </a:fillRef>
+          <a:effectRef idx="0">
+            <a:schemeClr val="accent1"/>
+          </a:effectRef>
+          <a:fontRef idx="minor">
+            <a:schemeClr val="tx1"/>
+          </a:fontRef>
+        </p:style>
+      </p:cxnSp>
+      <p:cxnSp>
+        <p:nvCxnSpPr>
+          <p:cNvPr id="19" name="Conector reto 18">
+            <a:extLst>
+              <a:ext uri="{FF2B5EF4-FFF2-40B4-BE49-F238E27FC236}">
+                <a16:creationId xmlns:a16="http://schemas.microsoft.com/office/drawing/2014/main" id="{11DACD32-D648-ED2A-8866-EC323A8725EF}"/>
+              </a:ext>
+            </a:extLst>
+          </p:cNvPr>
+          <p:cNvCxnSpPr>
+            <a:cxnSpLocks/>
+            <a:endCxn id="13" idx="2"/>
+          </p:cNvCxnSpPr>
+          <p:nvPr/>
+        </p:nvCxnSpPr>
+        <p:spPr>
+          <a:xfrm>
+            <a:off x="2461212" y="2098521"/>
+            <a:ext cx="1784022" cy="6039"/>
+          </a:xfrm>
+          <a:prstGeom prst="line">
+            <a:avLst/>
+          </a:prstGeom>
+          <a:ln w="57150">
+            <a:solidFill>
+              <a:srgbClr val="283618"/>
+            </a:solidFill>
+          </a:ln>
+        </p:spPr>
+        <p:style>
+          <a:lnRef idx="1">
+            <a:schemeClr val="accent1"/>
+          </a:lnRef>
+          <a:fillRef idx="0">
+            <a:schemeClr val="accent1"/>
+          </a:fillRef>
+          <a:effectRef idx="0">
+            <a:schemeClr val="accent1"/>
+          </a:effectRef>
+          <a:fontRef idx="minor">
+            <a:schemeClr val="tx1"/>
+          </a:fontRef>
+        </p:style>
+      </p:cxnSp>
+      <p:cxnSp>
+        <p:nvCxnSpPr>
+          <p:cNvPr id="20" name="Conector reto 19">
+            <a:extLst>
+              <a:ext uri="{FF2B5EF4-FFF2-40B4-BE49-F238E27FC236}">
+                <a16:creationId xmlns:a16="http://schemas.microsoft.com/office/drawing/2014/main" id="{A441E0F3-6BF0-F7AF-A427-830F71205AA8}"/>
+              </a:ext>
+            </a:extLst>
+          </p:cNvPr>
+          <p:cNvCxnSpPr>
+            <a:cxnSpLocks/>
+          </p:cNvCxnSpPr>
+          <p:nvPr/>
+        </p:nvCxnSpPr>
+        <p:spPr>
+          <a:xfrm>
+            <a:off x="2447925" y="2098675"/>
+            <a:ext cx="1857375" cy="730250"/>
+          </a:xfrm>
+          <a:prstGeom prst="line">
+            <a:avLst/>
+          </a:prstGeom>
+          <a:ln w="57150">
+            <a:solidFill>
+              <a:srgbClr val="283618"/>
+            </a:solidFill>
+          </a:ln>
+        </p:spPr>
+        <p:style>
+          <a:lnRef idx="1">
+            <a:schemeClr val="accent1"/>
+          </a:lnRef>
+          <a:fillRef idx="0">
+            <a:schemeClr val="accent1"/>
+          </a:fillRef>
+          <a:effectRef idx="0">
+            <a:schemeClr val="accent1"/>
+          </a:effectRef>
+          <a:fontRef idx="minor">
+            <a:schemeClr val="tx1"/>
+          </a:fontRef>
+        </p:style>
+      </p:cxnSp>
+      <p:cxnSp>
+        <p:nvCxnSpPr>
+          <p:cNvPr id="23" name="Conector reto 22">
+            <a:extLst>
+              <a:ext uri="{FF2B5EF4-FFF2-40B4-BE49-F238E27FC236}">
+                <a16:creationId xmlns:a16="http://schemas.microsoft.com/office/drawing/2014/main" id="{6E3F7771-A819-E02C-E366-BBF2180D5830}"/>
+              </a:ext>
+            </a:extLst>
+          </p:cNvPr>
+          <p:cNvCxnSpPr>
+            <a:cxnSpLocks/>
+          </p:cNvCxnSpPr>
+          <p:nvPr/>
+        </p:nvCxnSpPr>
+        <p:spPr>
+          <a:xfrm>
+            <a:off x="2447925" y="2108200"/>
+            <a:ext cx="1851025" cy="1463675"/>
+          </a:xfrm>
+          <a:prstGeom prst="line">
+            <a:avLst/>
+          </a:prstGeom>
+          <a:ln w="57150">
+            <a:solidFill>
+              <a:srgbClr val="283618"/>
+            </a:solidFill>
+          </a:ln>
+        </p:spPr>
+        <p:style>
+          <a:lnRef idx="1">
+            <a:schemeClr val="accent1"/>
+          </a:lnRef>
+          <a:fillRef idx="0">
+            <a:schemeClr val="accent1"/>
+          </a:fillRef>
+          <a:effectRef idx="0">
+            <a:schemeClr val="accent1"/>
+          </a:effectRef>
+          <a:fontRef idx="minor">
+            <a:schemeClr val="tx1"/>
+          </a:fontRef>
+        </p:style>
+      </p:cxnSp>
+      <p:cxnSp>
+        <p:nvCxnSpPr>
+          <p:cNvPr id="31" name="Conector reto 30">
+            <a:extLst>
+              <a:ext uri="{FF2B5EF4-FFF2-40B4-BE49-F238E27FC236}">
+                <a16:creationId xmlns:a16="http://schemas.microsoft.com/office/drawing/2014/main" id="{464E7F70-80C8-F61E-C4E5-81A3ADFB004D}"/>
+              </a:ext>
+            </a:extLst>
+          </p:cNvPr>
+          <p:cNvCxnSpPr>
+            <a:cxnSpLocks/>
+          </p:cNvCxnSpPr>
+          <p:nvPr/>
+        </p:nvCxnSpPr>
+        <p:spPr>
+          <a:xfrm>
+            <a:off x="5916610" y="2093494"/>
+            <a:ext cx="1291309" cy="4947"/>
+          </a:xfrm>
+          <a:prstGeom prst="line">
+            <a:avLst/>
+          </a:prstGeom>
+          <a:ln w="57150">
+            <a:solidFill>
+              <a:srgbClr val="283618"/>
+            </a:solidFill>
+            <a:headEnd type="none" w="med" len="med"/>
+            <a:tailEnd type="arrow" w="med" len="med"/>
+          </a:ln>
+        </p:spPr>
+        <p:style>
+          <a:lnRef idx="1">
+            <a:schemeClr val="accent1"/>
+          </a:lnRef>
+          <a:fillRef idx="0">
+            <a:schemeClr val="accent1"/>
+          </a:fillRef>
+          <a:effectRef idx="0">
+            <a:schemeClr val="accent1"/>
+          </a:effectRef>
+          <a:fontRef idx="minor">
+            <a:schemeClr val="tx1"/>
+          </a:fontRef>
+        </p:style>
+      </p:cxnSp>
+      <p:cxnSp>
+        <p:nvCxnSpPr>
+          <p:cNvPr id="32" name="Conector reto 31">
+            <a:extLst>
+              <a:ext uri="{FF2B5EF4-FFF2-40B4-BE49-F238E27FC236}">
+                <a16:creationId xmlns:a16="http://schemas.microsoft.com/office/drawing/2014/main" id="{5F7E83A5-D7EC-D7E2-C18A-417605B66145}"/>
+              </a:ext>
+            </a:extLst>
+          </p:cNvPr>
+          <p:cNvCxnSpPr>
+            <a:cxnSpLocks/>
+          </p:cNvCxnSpPr>
+          <p:nvPr/>
+        </p:nvCxnSpPr>
+        <p:spPr>
+          <a:xfrm>
+            <a:off x="5916610" y="2807661"/>
+            <a:ext cx="1291309" cy="4947"/>
+          </a:xfrm>
+          <a:prstGeom prst="line">
+            <a:avLst/>
+          </a:prstGeom>
+          <a:ln w="57150">
+            <a:solidFill>
+              <a:srgbClr val="283618"/>
+            </a:solidFill>
+            <a:headEnd type="none" w="med" len="med"/>
+            <a:tailEnd type="arrow" w="med" len="med"/>
+          </a:ln>
+        </p:spPr>
+        <p:style>
+          <a:lnRef idx="1">
+            <a:schemeClr val="accent1"/>
+          </a:lnRef>
+          <a:fillRef idx="0">
+            <a:schemeClr val="accent1"/>
+          </a:fillRef>
+          <a:effectRef idx="0">
+            <a:schemeClr val="accent1"/>
+          </a:effectRef>
+          <a:fontRef idx="minor">
+            <a:schemeClr val="tx1"/>
+          </a:fontRef>
+        </p:style>
+      </p:cxnSp>
+      <p:cxnSp>
+        <p:nvCxnSpPr>
+          <p:cNvPr id="33" name="Conector reto 32">
+            <a:extLst>
+              <a:ext uri="{FF2B5EF4-FFF2-40B4-BE49-F238E27FC236}">
+                <a16:creationId xmlns:a16="http://schemas.microsoft.com/office/drawing/2014/main" id="{80351B8F-6801-93AC-E817-401F445133D5}"/>
+              </a:ext>
+            </a:extLst>
+          </p:cNvPr>
+          <p:cNvCxnSpPr>
+            <a:cxnSpLocks/>
+          </p:cNvCxnSpPr>
+          <p:nvPr/>
+        </p:nvCxnSpPr>
+        <p:spPr>
+          <a:xfrm>
+            <a:off x="5916610" y="3499201"/>
+            <a:ext cx="1291309" cy="4947"/>
+          </a:xfrm>
+          <a:prstGeom prst="line">
+            <a:avLst/>
+          </a:prstGeom>
+          <a:ln w="57150">
+            <a:solidFill>
+              <a:srgbClr val="283618"/>
+            </a:solidFill>
+            <a:headEnd type="none" w="med" len="med"/>
+            <a:tailEnd type="arrow" w="med" len="med"/>
+          </a:ln>
+        </p:spPr>
+        <p:style>
+          <a:lnRef idx="1">
+            <a:schemeClr val="accent1"/>
+          </a:lnRef>
+          <a:fillRef idx="0">
+            <a:schemeClr val="accent1"/>
+          </a:fillRef>
+          <a:effectRef idx="0">
+            <a:schemeClr val="accent1"/>
+          </a:effectRef>
+          <a:fontRef idx="minor">
+            <a:schemeClr val="tx1"/>
+          </a:fontRef>
+        </p:style>
+      </p:cxnSp>
+      <p:cxnSp>
+        <p:nvCxnSpPr>
+          <p:cNvPr id="34" name="Conector reto 33">
+            <a:extLst>
+              <a:ext uri="{FF2B5EF4-FFF2-40B4-BE49-F238E27FC236}">
+                <a16:creationId xmlns:a16="http://schemas.microsoft.com/office/drawing/2014/main" id="{662E18ED-465C-F383-E0F9-5A2C14C0E919}"/>
+              </a:ext>
+            </a:extLst>
+          </p:cNvPr>
+          <p:cNvCxnSpPr>
+            <a:cxnSpLocks/>
+          </p:cNvCxnSpPr>
+          <p:nvPr/>
+        </p:nvCxnSpPr>
+        <p:spPr>
+          <a:xfrm>
+            <a:off x="5916611" y="1393074"/>
+            <a:ext cx="1291309" cy="4947"/>
+          </a:xfrm>
+          <a:prstGeom prst="line">
+            <a:avLst/>
+          </a:prstGeom>
+          <a:ln w="57150">
+            <a:solidFill>
+              <a:srgbClr val="606C38"/>
+            </a:solidFill>
+            <a:headEnd type="none" w="med" len="med"/>
+            <a:tailEnd type="arrow" w="med" len="med"/>
+          </a:ln>
+        </p:spPr>
+        <p:style>
+          <a:lnRef idx="1">
+            <a:schemeClr val="accent1"/>
+          </a:lnRef>
+          <a:fillRef idx="0">
+            <a:schemeClr val="accent1"/>
+          </a:fillRef>
+          <a:effectRef idx="0">
+            <a:schemeClr val="accent1"/>
+          </a:effectRef>
+          <a:fontRef idx="minor">
+            <a:schemeClr val="tx1"/>
+          </a:fontRef>
+        </p:style>
+      </p:cxnSp>
+      <p:sp>
+        <p:nvSpPr>
+          <p:cNvPr id="35" name="Retângulo 34">
+            <a:extLst>
+              <a:ext uri="{FF2B5EF4-FFF2-40B4-BE49-F238E27FC236}">
+                <a16:creationId xmlns:a16="http://schemas.microsoft.com/office/drawing/2014/main" id="{2F892C3C-09CE-EC66-F5C7-651D2BBCDA4F}"/>
+              </a:ext>
+            </a:extLst>
+          </p:cNvPr>
+          <p:cNvSpPr/>
+          <p:nvPr/>
+        </p:nvSpPr>
+        <p:spPr>
+          <a:xfrm>
+            <a:off x="7830513" y="1071435"/>
+            <a:ext cx="715379" cy="653172"/>
+          </a:xfrm>
+          <a:prstGeom prst="rect">
+            <a:avLst/>
+          </a:prstGeom>
+          <a:solidFill>
+            <a:srgbClr val="606C38"/>
+          </a:solidFill>
+          <a:ln>
+            <a:solidFill>
+              <a:srgbClr val="606C38"/>
+            </a:solidFill>
+          </a:ln>
+        </p:spPr>
+        <p:style>
+          <a:lnRef idx="2">
+            <a:schemeClr val="accent1">
+              <a:shade val="50000"/>
+            </a:schemeClr>
+          </a:lnRef>
+          <a:fillRef idx="1">
+            <a:schemeClr val="accent1"/>
+          </a:fillRef>
+          <a:effectRef idx="0">
+            <a:schemeClr val="accent1"/>
+          </a:effectRef>
+          <a:fontRef idx="minor">
+            <a:schemeClr val="lt1"/>
+          </a:fontRef>
+        </p:style>
+        <p:txBody>
+          <a:bodyPr rtlCol="0" anchor="ctr"/>
+          <a:lstStyle/>
+          <a:p>
+            <a:pPr algn="ctr"/>
+            <a:endParaRPr lang="pt-BR"/>
+          </a:p>
+        </p:txBody>
+      </p:sp>
+      <p:sp>
+        <p:nvSpPr>
+          <p:cNvPr id="36" name="Retângulo 35">
+            <a:extLst>
+              <a:ext uri="{FF2B5EF4-FFF2-40B4-BE49-F238E27FC236}">
+                <a16:creationId xmlns:a16="http://schemas.microsoft.com/office/drawing/2014/main" id="{5C9C105D-5654-C0CA-8B13-16565AD6C67F}"/>
+              </a:ext>
+            </a:extLst>
+          </p:cNvPr>
+          <p:cNvSpPr/>
+          <p:nvPr/>
+        </p:nvSpPr>
+        <p:spPr>
+          <a:xfrm>
+            <a:off x="7830513" y="1771855"/>
+            <a:ext cx="715379" cy="653172"/>
+          </a:xfrm>
+          <a:prstGeom prst="rect">
+            <a:avLst/>
+          </a:prstGeom>
+          <a:solidFill>
+            <a:srgbClr val="283618"/>
+          </a:solidFill>
+          <a:ln>
+            <a:solidFill>
+              <a:srgbClr val="283618"/>
+            </a:solidFill>
+          </a:ln>
+        </p:spPr>
+        <p:style>
+          <a:lnRef idx="2">
+            <a:schemeClr val="accent1">
+              <a:shade val="50000"/>
+            </a:schemeClr>
+          </a:lnRef>
+          <a:fillRef idx="1">
+            <a:schemeClr val="accent1"/>
+          </a:fillRef>
+          <a:effectRef idx="0">
+            <a:schemeClr val="accent1"/>
+          </a:effectRef>
+          <a:fontRef idx="minor">
+            <a:schemeClr val="lt1"/>
+          </a:fontRef>
+        </p:style>
+        <p:txBody>
+          <a:bodyPr rtlCol="0" anchor="ctr"/>
+          <a:lstStyle/>
+          <a:p>
+            <a:pPr algn="ctr"/>
+            <a:endParaRPr lang="pt-BR"/>
+          </a:p>
+        </p:txBody>
+      </p:sp>
+      <p:sp>
+        <p:nvSpPr>
+          <p:cNvPr id="37" name="Retângulo 36">
+            <a:extLst>
+              <a:ext uri="{FF2B5EF4-FFF2-40B4-BE49-F238E27FC236}">
+                <a16:creationId xmlns:a16="http://schemas.microsoft.com/office/drawing/2014/main" id="{12B9D86E-9E71-D410-31C3-FD4B778FFF51}"/>
+              </a:ext>
+            </a:extLst>
+          </p:cNvPr>
+          <p:cNvSpPr/>
+          <p:nvPr/>
+        </p:nvSpPr>
+        <p:spPr>
+          <a:xfrm>
+            <a:off x="7830513" y="2471019"/>
+            <a:ext cx="715379" cy="653172"/>
+          </a:xfrm>
+          <a:prstGeom prst="rect">
+            <a:avLst/>
+          </a:prstGeom>
+          <a:solidFill>
+            <a:srgbClr val="283618"/>
+          </a:solidFill>
+          <a:ln>
+            <a:solidFill>
+              <a:srgbClr val="283618"/>
+            </a:solidFill>
+          </a:ln>
+        </p:spPr>
+        <p:style>
+          <a:lnRef idx="2">
+            <a:schemeClr val="accent1">
+              <a:shade val="50000"/>
+            </a:schemeClr>
+          </a:lnRef>
+          <a:fillRef idx="1">
+            <a:schemeClr val="accent1"/>
+          </a:fillRef>
+          <a:effectRef idx="0">
+            <a:schemeClr val="accent1"/>
+          </a:effectRef>
+          <a:fontRef idx="minor">
+            <a:schemeClr val="lt1"/>
+          </a:fontRef>
+        </p:style>
+        <p:txBody>
+          <a:bodyPr rtlCol="0" anchor="ctr"/>
+          <a:lstStyle/>
+          <a:p>
+            <a:pPr algn="ctr"/>
+            <a:endParaRPr lang="pt-BR"/>
+          </a:p>
+        </p:txBody>
+      </p:sp>
+      <p:sp>
+        <p:nvSpPr>
+          <p:cNvPr id="38" name="Retângulo 37">
+            <a:extLst>
+              <a:ext uri="{FF2B5EF4-FFF2-40B4-BE49-F238E27FC236}">
+                <a16:creationId xmlns:a16="http://schemas.microsoft.com/office/drawing/2014/main" id="{FADBBFD4-0E15-A5F8-66ED-C4B19DCBA887}"/>
+              </a:ext>
+            </a:extLst>
+          </p:cNvPr>
+          <p:cNvSpPr/>
+          <p:nvPr/>
+        </p:nvSpPr>
+        <p:spPr>
+          <a:xfrm>
+            <a:off x="7830513" y="3177562"/>
+            <a:ext cx="715379" cy="653172"/>
+          </a:xfrm>
+          <a:prstGeom prst="rect">
+            <a:avLst/>
+          </a:prstGeom>
+          <a:solidFill>
+            <a:srgbClr val="283618"/>
+          </a:solidFill>
+          <a:ln>
+            <a:solidFill>
+              <a:srgbClr val="283618"/>
+            </a:solidFill>
+          </a:ln>
+        </p:spPr>
+        <p:style>
+          <a:lnRef idx="2">
+            <a:schemeClr val="accent1">
+              <a:shade val="50000"/>
+            </a:schemeClr>
+          </a:lnRef>
+          <a:fillRef idx="1">
+            <a:schemeClr val="accent1"/>
+          </a:fillRef>
+          <a:effectRef idx="0">
+            <a:schemeClr val="accent1"/>
+          </a:effectRef>
+          <a:fontRef idx="minor">
+            <a:schemeClr val="lt1"/>
+          </a:fontRef>
+        </p:style>
+        <p:txBody>
+          <a:bodyPr rtlCol="0" anchor="ctr"/>
+          <a:lstStyle/>
+          <a:p>
+            <a:pPr algn="ctr"/>
+            <a:endParaRPr lang="pt-BR"/>
+          </a:p>
+        </p:txBody>
+      </p:sp>
+      <p:sp>
+        <p:nvSpPr>
+          <p:cNvPr id="46" name="Retângulo 45">
+            <a:extLst>
+              <a:ext uri="{FF2B5EF4-FFF2-40B4-BE49-F238E27FC236}">
+                <a16:creationId xmlns:a16="http://schemas.microsoft.com/office/drawing/2014/main" id="{FE4F7420-13DF-849B-6038-8AD7124433C3}"/>
+              </a:ext>
+            </a:extLst>
+          </p:cNvPr>
+          <p:cNvSpPr/>
+          <p:nvPr/>
+        </p:nvSpPr>
+        <p:spPr>
+          <a:xfrm>
+            <a:off x="1253120" y="3185817"/>
+            <a:ext cx="715379" cy="653172"/>
+          </a:xfrm>
+          <a:prstGeom prst="rect">
+            <a:avLst/>
+          </a:prstGeom>
+          <a:solidFill>
+            <a:srgbClr val="DDA15E"/>
+          </a:solidFill>
+          <a:ln>
+            <a:solidFill>
+              <a:srgbClr val="DDA15E"/>
+            </a:solidFill>
+          </a:ln>
+        </p:spPr>
+        <p:style>
+          <a:lnRef idx="2">
+            <a:schemeClr val="accent1">
+              <a:shade val="50000"/>
+            </a:schemeClr>
+          </a:lnRef>
+          <a:fillRef idx="1">
+            <a:schemeClr val="accent1"/>
+          </a:fillRef>
+          <a:effectRef idx="0">
+            <a:schemeClr val="accent1"/>
+          </a:effectRef>
+          <a:fontRef idx="minor">
+            <a:schemeClr val="lt1"/>
+          </a:fontRef>
+        </p:style>
+        <p:txBody>
+          <a:bodyPr rtlCol="0" anchor="ctr"/>
+          <a:lstStyle/>
+          <a:p>
+            <a:pPr algn="ctr"/>
+            <a:endParaRPr lang="pt-BR"/>
+          </a:p>
+        </p:txBody>
+      </p:sp>
+      <p:sp>
+        <p:nvSpPr>
+          <p:cNvPr id="47" name="Retângulo 46">
+            <a:extLst>
+              <a:ext uri="{FF2B5EF4-FFF2-40B4-BE49-F238E27FC236}">
+                <a16:creationId xmlns:a16="http://schemas.microsoft.com/office/drawing/2014/main" id="{E2613739-C045-A144-A0F8-33B939B31091}"/>
+              </a:ext>
+            </a:extLst>
+          </p:cNvPr>
+          <p:cNvSpPr/>
+          <p:nvPr/>
+        </p:nvSpPr>
+        <p:spPr>
+          <a:xfrm>
+            <a:off x="7830513" y="3885515"/>
+            <a:ext cx="715379" cy="653172"/>
+          </a:xfrm>
+          <a:prstGeom prst="rect">
+            <a:avLst/>
+          </a:prstGeom>
+          <a:solidFill>
+            <a:srgbClr val="DDA15E"/>
+          </a:solidFill>
+          <a:ln>
+            <a:solidFill>
+              <a:srgbClr val="DDA15E"/>
+            </a:solidFill>
+          </a:ln>
+        </p:spPr>
+        <p:style>
+          <a:lnRef idx="2">
+            <a:schemeClr val="accent1">
+              <a:shade val="50000"/>
+            </a:schemeClr>
+          </a:lnRef>
+          <a:fillRef idx="1">
+            <a:schemeClr val="accent1"/>
+          </a:fillRef>
+          <a:effectRef idx="0">
+            <a:schemeClr val="accent1"/>
+          </a:effectRef>
+          <a:fontRef idx="minor">
+            <a:schemeClr val="lt1"/>
+          </a:fontRef>
+        </p:style>
+        <p:txBody>
+          <a:bodyPr rtlCol="0" anchor="ctr"/>
+          <a:lstStyle/>
+          <a:p>
+            <a:pPr algn="ctr"/>
+            <a:endParaRPr lang="pt-BR"/>
+          </a:p>
+        </p:txBody>
+      </p:sp>
+      <p:sp>
+        <p:nvSpPr>
+          <p:cNvPr id="48" name="Retângulo 47">
+            <a:extLst>
+              <a:ext uri="{FF2B5EF4-FFF2-40B4-BE49-F238E27FC236}">
+                <a16:creationId xmlns:a16="http://schemas.microsoft.com/office/drawing/2014/main" id="{A55778FB-8DBB-3572-DB79-8E038CFBC712}"/>
+              </a:ext>
+            </a:extLst>
+          </p:cNvPr>
+          <p:cNvSpPr/>
+          <p:nvPr/>
+        </p:nvSpPr>
+        <p:spPr>
+          <a:xfrm>
+            <a:off x="7830512" y="4592775"/>
+            <a:ext cx="715379" cy="653172"/>
+          </a:xfrm>
+          <a:prstGeom prst="rect">
+            <a:avLst/>
+          </a:prstGeom>
+          <a:solidFill>
+            <a:srgbClr val="DDA15E"/>
+          </a:solidFill>
+          <a:ln>
+            <a:solidFill>
+              <a:srgbClr val="DDA15E"/>
+            </a:solidFill>
+          </a:ln>
+        </p:spPr>
+        <p:style>
+          <a:lnRef idx="2">
+            <a:schemeClr val="accent1">
+              <a:shade val="50000"/>
+            </a:schemeClr>
+          </a:lnRef>
+          <a:fillRef idx="1">
+            <a:schemeClr val="accent1"/>
+          </a:fillRef>
+          <a:effectRef idx="0">
+            <a:schemeClr val="accent1"/>
+          </a:effectRef>
+          <a:fontRef idx="minor">
+            <a:schemeClr val="lt1"/>
+          </a:fontRef>
+        </p:style>
+        <p:txBody>
+          <a:bodyPr rtlCol="0" anchor="ctr"/>
+          <a:lstStyle/>
+          <a:p>
+            <a:pPr algn="ctr"/>
+            <a:endParaRPr lang="pt-BR"/>
+          </a:p>
+        </p:txBody>
+      </p:sp>
+      <p:sp>
+        <p:nvSpPr>
+          <p:cNvPr id="57" name="CaixaDeTexto 56">
+            <a:extLst>
+              <a:ext uri="{FF2B5EF4-FFF2-40B4-BE49-F238E27FC236}">
+                <a16:creationId xmlns:a16="http://schemas.microsoft.com/office/drawing/2014/main" id="{7F025D85-4D0B-D30C-F5C7-89782B520AC7}"/>
+              </a:ext>
+            </a:extLst>
+          </p:cNvPr>
+          <p:cNvSpPr txBox="1"/>
+          <p:nvPr/>
+        </p:nvSpPr>
+        <p:spPr>
+          <a:xfrm>
+            <a:off x="1319220" y="1893439"/>
+            <a:ext cx="585497" cy="400110"/>
+          </a:xfrm>
+          <a:prstGeom prst="rect">
+            <a:avLst/>
+          </a:prstGeom>
+          <a:noFill/>
+        </p:spPr>
+        <p:txBody>
+          <a:bodyPr wrap="square" rtlCol="0" anchor="ctr">
+            <a:spAutoFit/>
+          </a:bodyPr>
+          <a:lstStyle/>
+          <a:p>
+            <a:pPr algn="ctr"/>
+            <a:r>
+              <a:rPr lang="en-US" sz="2000" b="1" dirty="0">
+                <a:solidFill>
+                  <a:schemeClr val="bg1"/>
+                </a:solidFill>
+                <a:latin typeface="Inconsolata" panose="00000509000000000000" pitchFamily="49" charset="0"/>
+                <a:ea typeface="Inconsolata" panose="00000509000000000000" pitchFamily="49" charset="0"/>
+              </a:rPr>
+              <a:t>105</a:t>
+            </a:r>
+            <a:endParaRPr lang="pt-BR" sz="2000" b="1" dirty="0">
+              <a:solidFill>
+                <a:schemeClr val="bg1"/>
+              </a:solidFill>
+              <a:latin typeface="Inconsolata" panose="00000509000000000000" pitchFamily="49" charset="0"/>
+              <a:ea typeface="Inconsolata" panose="00000509000000000000" pitchFamily="49" charset="0"/>
+            </a:endParaRPr>
+          </a:p>
+        </p:txBody>
+      </p:sp>
+      <p:sp>
+        <p:nvSpPr>
+          <p:cNvPr id="58" name="CaixaDeTexto 57">
+            <a:extLst>
+              <a:ext uri="{FF2B5EF4-FFF2-40B4-BE49-F238E27FC236}">
+                <a16:creationId xmlns:a16="http://schemas.microsoft.com/office/drawing/2014/main" id="{08A30378-2753-A60A-217E-733A89BF63CE}"/>
+              </a:ext>
+            </a:extLst>
+          </p:cNvPr>
+          <p:cNvSpPr txBox="1"/>
+          <p:nvPr/>
+        </p:nvSpPr>
+        <p:spPr>
+          <a:xfrm>
+            <a:off x="4765250" y="1908145"/>
+            <a:ext cx="585497" cy="400110"/>
+          </a:xfrm>
+          <a:prstGeom prst="rect">
+            <a:avLst/>
+          </a:prstGeom>
+          <a:noFill/>
+        </p:spPr>
+        <p:txBody>
+          <a:bodyPr wrap="square" rtlCol="0" anchor="ctr">
+            <a:spAutoFit/>
+          </a:bodyPr>
+          <a:lstStyle/>
+          <a:p>
+            <a:pPr algn="ctr"/>
+            <a:r>
+              <a:rPr lang="en-US" sz="2000" b="1" dirty="0">
+                <a:solidFill>
+                  <a:schemeClr val="bg1"/>
+                </a:solidFill>
+                <a:latin typeface="Inconsolata" panose="00000509000000000000" pitchFamily="49" charset="0"/>
+                <a:ea typeface="Inconsolata" panose="00000509000000000000" pitchFamily="49" charset="0"/>
+              </a:rPr>
+              <a:t>105</a:t>
+            </a:r>
+            <a:endParaRPr lang="pt-BR" sz="2000" b="1" dirty="0">
+              <a:solidFill>
+                <a:schemeClr val="bg1"/>
+              </a:solidFill>
+              <a:latin typeface="Inconsolata" panose="00000509000000000000" pitchFamily="49" charset="0"/>
+              <a:ea typeface="Inconsolata" panose="00000509000000000000" pitchFamily="49" charset="0"/>
+            </a:endParaRPr>
+          </a:p>
+        </p:txBody>
+      </p:sp>
+      <p:sp>
+        <p:nvSpPr>
+          <p:cNvPr id="59" name="CaixaDeTexto 58">
+            <a:extLst>
+              <a:ext uri="{FF2B5EF4-FFF2-40B4-BE49-F238E27FC236}">
+                <a16:creationId xmlns:a16="http://schemas.microsoft.com/office/drawing/2014/main" id="{D7AE0ABB-4F3F-8572-4CBF-BC3A5FE7E658}"/>
+              </a:ext>
+            </a:extLst>
+          </p:cNvPr>
+          <p:cNvSpPr txBox="1"/>
+          <p:nvPr/>
+        </p:nvSpPr>
+        <p:spPr>
+          <a:xfrm>
+            <a:off x="4747563" y="2597550"/>
+            <a:ext cx="585497" cy="400110"/>
+          </a:xfrm>
+          <a:prstGeom prst="rect">
+            <a:avLst/>
+          </a:prstGeom>
+          <a:noFill/>
+        </p:spPr>
+        <p:txBody>
+          <a:bodyPr wrap="square" rtlCol="0" anchor="ctr">
+            <a:spAutoFit/>
+          </a:bodyPr>
+          <a:lstStyle/>
+          <a:p>
+            <a:pPr algn="ctr"/>
+            <a:r>
+              <a:rPr lang="en-US" sz="2000" b="1" dirty="0">
+                <a:solidFill>
+                  <a:schemeClr val="bg1"/>
+                </a:solidFill>
+                <a:latin typeface="Inconsolata" panose="00000509000000000000" pitchFamily="49" charset="0"/>
+                <a:ea typeface="Inconsolata" panose="00000509000000000000" pitchFamily="49" charset="0"/>
+              </a:rPr>
+              <a:t>105</a:t>
+            </a:r>
+            <a:endParaRPr lang="pt-BR" sz="2000" b="1" dirty="0">
+              <a:solidFill>
+                <a:schemeClr val="bg1"/>
+              </a:solidFill>
+              <a:latin typeface="Inconsolata" panose="00000509000000000000" pitchFamily="49" charset="0"/>
+              <a:ea typeface="Inconsolata" panose="00000509000000000000" pitchFamily="49" charset="0"/>
+            </a:endParaRPr>
+          </a:p>
+        </p:txBody>
+      </p:sp>
+      <p:sp>
+        <p:nvSpPr>
+          <p:cNvPr id="60" name="CaixaDeTexto 59">
+            <a:extLst>
+              <a:ext uri="{FF2B5EF4-FFF2-40B4-BE49-F238E27FC236}">
+                <a16:creationId xmlns:a16="http://schemas.microsoft.com/office/drawing/2014/main" id="{0563F338-9C98-09BA-1BB4-F2DE9A38A088}"/>
+              </a:ext>
+            </a:extLst>
+          </p:cNvPr>
+          <p:cNvSpPr txBox="1"/>
+          <p:nvPr/>
+        </p:nvSpPr>
+        <p:spPr>
+          <a:xfrm>
+            <a:off x="4747563" y="3309093"/>
+            <a:ext cx="585497" cy="400110"/>
+          </a:xfrm>
+          <a:prstGeom prst="rect">
+            <a:avLst/>
+          </a:prstGeom>
+          <a:noFill/>
+        </p:spPr>
+        <p:txBody>
+          <a:bodyPr wrap="square" rtlCol="0" anchor="ctr">
+            <a:spAutoFit/>
+          </a:bodyPr>
+          <a:lstStyle/>
+          <a:p>
+            <a:pPr algn="ctr"/>
+            <a:r>
+              <a:rPr lang="en-US" sz="2000" b="1" dirty="0">
+                <a:solidFill>
+                  <a:schemeClr val="bg1"/>
+                </a:solidFill>
+                <a:latin typeface="Inconsolata" panose="00000509000000000000" pitchFamily="49" charset="0"/>
+                <a:ea typeface="Inconsolata" panose="00000509000000000000" pitchFamily="49" charset="0"/>
+              </a:rPr>
+              <a:t>105</a:t>
+            </a:r>
+            <a:endParaRPr lang="pt-BR" sz="2000" b="1" dirty="0">
+              <a:solidFill>
+                <a:schemeClr val="bg1"/>
+              </a:solidFill>
+              <a:latin typeface="Inconsolata" panose="00000509000000000000" pitchFamily="49" charset="0"/>
+              <a:ea typeface="Inconsolata" panose="00000509000000000000" pitchFamily="49" charset="0"/>
+            </a:endParaRPr>
+          </a:p>
+        </p:txBody>
+      </p:sp>
+      <p:sp>
+        <p:nvSpPr>
+          <p:cNvPr id="61" name="CaixaDeTexto 60">
+            <a:extLst>
+              <a:ext uri="{FF2B5EF4-FFF2-40B4-BE49-F238E27FC236}">
+                <a16:creationId xmlns:a16="http://schemas.microsoft.com/office/drawing/2014/main" id="{7BF8DD17-2039-38B7-4FFB-FCF57E26F5A0}"/>
+              </a:ext>
+            </a:extLst>
+          </p:cNvPr>
+          <p:cNvSpPr txBox="1"/>
+          <p:nvPr/>
+        </p:nvSpPr>
+        <p:spPr>
+          <a:xfrm>
+            <a:off x="7895452" y="1901485"/>
+            <a:ext cx="585497" cy="400110"/>
+          </a:xfrm>
+          <a:prstGeom prst="rect">
+            <a:avLst/>
+          </a:prstGeom>
+          <a:noFill/>
+        </p:spPr>
+        <p:txBody>
+          <a:bodyPr wrap="square" rtlCol="0" anchor="ctr">
+            <a:spAutoFit/>
+          </a:bodyPr>
+          <a:lstStyle/>
+          <a:p>
+            <a:pPr algn="ctr"/>
+            <a:r>
+              <a:rPr lang="en-US" sz="2000" b="1" dirty="0">
+                <a:solidFill>
+                  <a:schemeClr val="bg1"/>
+                </a:solidFill>
+                <a:latin typeface="Inconsolata" panose="00000509000000000000" pitchFamily="49" charset="0"/>
+                <a:ea typeface="Inconsolata" panose="00000509000000000000" pitchFamily="49" charset="0"/>
+              </a:rPr>
+              <a:t>105</a:t>
+            </a:r>
+            <a:endParaRPr lang="pt-BR" sz="2000" b="1" dirty="0">
+              <a:solidFill>
+                <a:schemeClr val="bg1"/>
+              </a:solidFill>
+              <a:latin typeface="Inconsolata" panose="00000509000000000000" pitchFamily="49" charset="0"/>
+              <a:ea typeface="Inconsolata" panose="00000509000000000000" pitchFamily="49" charset="0"/>
+            </a:endParaRPr>
+          </a:p>
+        </p:txBody>
+      </p:sp>
+      <p:sp>
+        <p:nvSpPr>
+          <p:cNvPr id="62" name="CaixaDeTexto 61">
+            <a:extLst>
+              <a:ext uri="{FF2B5EF4-FFF2-40B4-BE49-F238E27FC236}">
+                <a16:creationId xmlns:a16="http://schemas.microsoft.com/office/drawing/2014/main" id="{472908B1-2EDA-9C89-17A8-E16659410FFE}"/>
+              </a:ext>
+            </a:extLst>
+          </p:cNvPr>
+          <p:cNvSpPr txBox="1"/>
+          <p:nvPr/>
+        </p:nvSpPr>
+        <p:spPr>
+          <a:xfrm>
+            <a:off x="7891463" y="2590165"/>
+            <a:ext cx="585497" cy="400110"/>
+          </a:xfrm>
+          <a:prstGeom prst="rect">
+            <a:avLst/>
+          </a:prstGeom>
+          <a:noFill/>
+        </p:spPr>
+        <p:txBody>
+          <a:bodyPr wrap="square" rtlCol="0" anchor="ctr">
+            <a:spAutoFit/>
+          </a:bodyPr>
+          <a:lstStyle/>
+          <a:p>
+            <a:pPr algn="ctr"/>
+            <a:r>
+              <a:rPr lang="en-US" sz="2000" b="1" dirty="0">
+                <a:solidFill>
+                  <a:schemeClr val="bg1"/>
+                </a:solidFill>
+                <a:latin typeface="Inconsolata" panose="00000509000000000000" pitchFamily="49" charset="0"/>
+                <a:ea typeface="Inconsolata" panose="00000509000000000000" pitchFamily="49" charset="0"/>
+              </a:rPr>
+              <a:t>105</a:t>
+            </a:r>
+            <a:endParaRPr lang="pt-BR" sz="2000" b="1" dirty="0">
+              <a:solidFill>
+                <a:schemeClr val="bg1"/>
+              </a:solidFill>
+              <a:latin typeface="Inconsolata" panose="00000509000000000000" pitchFamily="49" charset="0"/>
+              <a:ea typeface="Inconsolata" panose="00000509000000000000" pitchFamily="49" charset="0"/>
+            </a:endParaRPr>
+          </a:p>
+        </p:txBody>
+      </p:sp>
+      <p:sp>
+        <p:nvSpPr>
+          <p:cNvPr id="63" name="CaixaDeTexto 62">
+            <a:extLst>
+              <a:ext uri="{FF2B5EF4-FFF2-40B4-BE49-F238E27FC236}">
+                <a16:creationId xmlns:a16="http://schemas.microsoft.com/office/drawing/2014/main" id="{2F597594-1AC9-0460-800B-461F881C1FEA}"/>
+              </a:ext>
+            </a:extLst>
+          </p:cNvPr>
+          <p:cNvSpPr txBox="1"/>
+          <p:nvPr/>
+        </p:nvSpPr>
+        <p:spPr>
+          <a:xfrm>
+            <a:off x="7891463" y="3301708"/>
+            <a:ext cx="585497" cy="400110"/>
+          </a:xfrm>
+          <a:prstGeom prst="rect">
+            <a:avLst/>
+          </a:prstGeom>
+          <a:noFill/>
+        </p:spPr>
+        <p:txBody>
+          <a:bodyPr wrap="square" rtlCol="0" anchor="ctr">
+            <a:spAutoFit/>
+          </a:bodyPr>
+          <a:lstStyle/>
+          <a:p>
+            <a:pPr algn="ctr"/>
+            <a:r>
+              <a:rPr lang="en-US" sz="2000" b="1" dirty="0">
+                <a:solidFill>
+                  <a:schemeClr val="bg1"/>
+                </a:solidFill>
+                <a:latin typeface="Inconsolata" panose="00000509000000000000" pitchFamily="49" charset="0"/>
+                <a:ea typeface="Inconsolata" panose="00000509000000000000" pitchFamily="49" charset="0"/>
+              </a:rPr>
+              <a:t>105</a:t>
+            </a:r>
+            <a:endParaRPr lang="pt-BR" sz="2000" b="1" dirty="0">
+              <a:solidFill>
+                <a:schemeClr val="bg1"/>
+              </a:solidFill>
+              <a:latin typeface="Inconsolata" panose="00000509000000000000" pitchFamily="49" charset="0"/>
+              <a:ea typeface="Inconsolata" panose="00000509000000000000" pitchFamily="49" charset="0"/>
+            </a:endParaRPr>
+          </a:p>
+        </p:txBody>
+      </p:sp>
+      <p:sp>
+        <p:nvSpPr>
+          <p:cNvPr id="16" name="CaixaDeTexto 15">
+            <a:extLst>
+              <a:ext uri="{FF2B5EF4-FFF2-40B4-BE49-F238E27FC236}">
+                <a16:creationId xmlns:a16="http://schemas.microsoft.com/office/drawing/2014/main" id="{7BE80335-323F-63B1-299D-CB488281EB91}"/>
+              </a:ext>
+            </a:extLst>
+          </p:cNvPr>
+          <p:cNvSpPr txBox="1"/>
+          <p:nvPr/>
+        </p:nvSpPr>
+        <p:spPr>
+          <a:xfrm>
+            <a:off x="648476" y="525978"/>
+            <a:ext cx="1924665" cy="400110"/>
+          </a:xfrm>
+          <a:prstGeom prst="rect">
+            <a:avLst/>
+          </a:prstGeom>
+          <a:noFill/>
+        </p:spPr>
+        <p:txBody>
+          <a:bodyPr wrap="square" rtlCol="0">
+            <a:spAutoFit/>
+          </a:bodyPr>
+          <a:lstStyle/>
+          <a:p>
+            <a:pPr algn="ctr"/>
+            <a:r>
+              <a:rPr lang="en-US" sz="2000" dirty="0" err="1">
+                <a:latin typeface="Inconsolata" panose="00000509000000000000" pitchFamily="49" charset="0"/>
+                <a:ea typeface="Inconsolata" panose="00000509000000000000" pitchFamily="49" charset="0"/>
+              </a:rPr>
+              <a:t>cores_de_pele</a:t>
+            </a:r>
+            <a:endParaRPr lang="pt-BR" sz="2000" dirty="0">
+              <a:latin typeface="Inconsolata" panose="00000509000000000000" pitchFamily="49" charset="0"/>
+              <a:ea typeface="Inconsolata" panose="00000509000000000000" pitchFamily="49" charset="0"/>
+            </a:endParaRPr>
+          </a:p>
+        </p:txBody>
+      </p:sp>
+      <p:sp>
+        <p:nvSpPr>
+          <p:cNvPr id="18" name="CaixaDeTexto 17">
+            <a:extLst>
+              <a:ext uri="{FF2B5EF4-FFF2-40B4-BE49-F238E27FC236}">
+                <a16:creationId xmlns:a16="http://schemas.microsoft.com/office/drawing/2014/main" id="{86638EDE-FB91-4C02-1DA9-9B0BF44259F7}"/>
+              </a:ext>
+            </a:extLst>
+          </p:cNvPr>
+          <p:cNvSpPr txBox="1"/>
+          <p:nvPr/>
+        </p:nvSpPr>
+        <p:spPr>
+          <a:xfrm>
+            <a:off x="4077978" y="522889"/>
+            <a:ext cx="1924665" cy="400110"/>
+          </a:xfrm>
+          <a:prstGeom prst="rect">
+            <a:avLst/>
+          </a:prstGeom>
+          <a:noFill/>
+        </p:spPr>
+        <p:txBody>
+          <a:bodyPr wrap="square" rtlCol="0">
+            <a:spAutoFit/>
+          </a:bodyPr>
+          <a:lstStyle/>
+          <a:p>
+            <a:pPr algn="ctr"/>
+            <a:r>
+              <a:rPr lang="en-US" sz="2000" dirty="0" err="1">
+                <a:latin typeface="Inconsolata" panose="00000509000000000000" pitchFamily="49" charset="0"/>
+                <a:ea typeface="Inconsolata" panose="00000509000000000000" pitchFamily="49" charset="0"/>
+              </a:rPr>
+              <a:t>alturas</a:t>
+            </a:r>
+            <a:endParaRPr lang="pt-BR" sz="2000" dirty="0">
+              <a:latin typeface="Inconsolata" panose="00000509000000000000" pitchFamily="49" charset="0"/>
+              <a:ea typeface="Inconsolata" panose="00000509000000000000" pitchFamily="49" charset="0"/>
+            </a:endParaRPr>
+          </a:p>
+        </p:txBody>
+      </p:sp>
+      <p:sp>
+        <p:nvSpPr>
+          <p:cNvPr id="21" name="CaixaDeTexto 20">
+            <a:extLst>
+              <a:ext uri="{FF2B5EF4-FFF2-40B4-BE49-F238E27FC236}">
+                <a16:creationId xmlns:a16="http://schemas.microsoft.com/office/drawing/2014/main" id="{BC83CD56-060C-CA93-39EB-18C597044A4B}"/>
+              </a:ext>
+            </a:extLst>
+          </p:cNvPr>
+          <p:cNvSpPr txBox="1"/>
+          <p:nvPr/>
+        </p:nvSpPr>
+        <p:spPr>
+          <a:xfrm>
+            <a:off x="6915261" y="311748"/>
+            <a:ext cx="2504683" cy="707886"/>
+          </a:xfrm>
+          <a:prstGeom prst="rect">
+            <a:avLst/>
+          </a:prstGeom>
+          <a:noFill/>
+        </p:spPr>
+        <p:txBody>
+          <a:bodyPr wrap="square" rtlCol="0">
+            <a:spAutoFit/>
+          </a:bodyPr>
+          <a:lstStyle/>
+          <a:p>
+            <a:pPr algn="ctr"/>
+            <a:r>
+              <a:rPr lang="en-US" sz="2000" dirty="0" err="1">
+                <a:latin typeface="Inconsolata" panose="00000509000000000000" pitchFamily="49" charset="0"/>
+                <a:ea typeface="Inconsolata" panose="00000509000000000000" pitchFamily="49" charset="0"/>
+              </a:rPr>
+              <a:t>Tabela</a:t>
+            </a:r>
+            <a:r>
+              <a:rPr lang="en-US" sz="2000" dirty="0">
+                <a:latin typeface="Inconsolata" panose="00000509000000000000" pitchFamily="49" charset="0"/>
+                <a:ea typeface="Inconsolata" panose="00000509000000000000" pitchFamily="49" charset="0"/>
+              </a:rPr>
+              <a:t> </a:t>
+            </a:r>
+            <a:r>
+              <a:rPr lang="en-US" sz="2000" dirty="0" err="1">
+                <a:latin typeface="Inconsolata" panose="00000509000000000000" pitchFamily="49" charset="0"/>
+                <a:ea typeface="Inconsolata" panose="00000509000000000000" pitchFamily="49" charset="0"/>
+              </a:rPr>
+              <a:t>resultado</a:t>
+            </a:r>
+            <a:r>
+              <a:rPr lang="en-US" sz="2000" dirty="0">
+                <a:latin typeface="Inconsolata" panose="00000509000000000000" pitchFamily="49" charset="0"/>
+                <a:ea typeface="Inconsolata" panose="00000509000000000000" pitchFamily="49" charset="0"/>
+              </a:rPr>
+              <a:t> do JOIN</a:t>
+            </a:r>
+            <a:endParaRPr lang="pt-BR" sz="2000" dirty="0">
+              <a:latin typeface="Inconsolata" panose="00000509000000000000" pitchFamily="49" charset="0"/>
+              <a:ea typeface="Inconsolata" panose="00000509000000000000" pitchFamily="49" charset="0"/>
+            </a:endParaRPr>
+          </a:p>
+        </p:txBody>
+      </p:sp>
     </p:spTree>
   </p:cSld>
-  <mc:AlternateContent>
-    <mc:Choice Requires="p14">
-      <p:transition spd="slow" p14:dur="2000"/>
-    </mc:Choice>
-    <mc:Fallback>
-      <p:transition spd="slow"/>
-    </mc:Fallback>
-  </mc:AlternateContent>
+  <p:clrMapOvr>
+    <a:masterClrMapping/>
+  </p:clrMapOvr>
 </p:sld>
 </file>
 
@@ -1772,31 +4189,31 @@
         <a:sysClr val="window" lastClr="FFFFFF"/>
       </a:lt1>
       <a:dk2>
-        <a:srgbClr val="1f497d"/>
+        <a:srgbClr val="1F497D"/>
       </a:dk2>
       <a:lt2>
-        <a:srgbClr val="eeece1"/>
+        <a:srgbClr val="EEECE1"/>
       </a:lt2>
       <a:accent1>
-        <a:srgbClr val="4f81bd"/>
+        <a:srgbClr val="4F81BD"/>
       </a:accent1>
       <a:accent2>
-        <a:srgbClr val="c0504d"/>
+        <a:srgbClr val="C0504D"/>
       </a:accent2>
       <a:accent3>
-        <a:srgbClr val="9bbb59"/>
+        <a:srgbClr val="9BBB59"/>
       </a:accent3>
       <a:accent4>
-        <a:srgbClr val="8064a2"/>
+        <a:srgbClr val="8064A2"/>
       </a:accent4>
       <a:accent5>
-        <a:srgbClr val="4bacc6"/>
+        <a:srgbClr val="4BACC6"/>
       </a:accent5>
       <a:accent6>
-        <a:srgbClr val="f79646"/>
+        <a:srgbClr val="F79646"/>
       </a:accent6>
       <a:hlink>
-        <a:srgbClr val="0000ff"/>
+        <a:srgbClr val="0000FF"/>
       </a:hlink>
       <a:folHlink>
         <a:srgbClr val="800080"/>
@@ -1984,5 +4401,7 @@
       </a:bgFillStyleLst>
     </a:fmtScheme>
   </a:themeElements>
+  <a:objectDefaults/>
+  <a:extraClrSchemeLst/>
 </a:theme>
 </file>
</xml_diff>

<commit_message>
Update page and figure
</commit_message>
<xml_diff>
--- a/posts/2023-01-10-join-duplicates/expansao.pptx
+++ b/posts/2023-01-10-join-duplicates/expansao.pptx
@@ -4035,7 +4035,7 @@
         <p:spPr>
           <a:xfrm>
             <a:off x="648476" y="525978"/>
-            <a:ext cx="1924665" cy="400110"/>
+            <a:ext cx="1924665" cy="338554"/>
           </a:xfrm>
           <a:prstGeom prst="rect">
             <a:avLst/>
@@ -4050,14 +4050,14 @@
           <a:p>
             <a:pPr algn="ctr"/>
             <a:r>
-              <a:rPr lang="en-US" sz="2000" dirty="0" err="1">
-                <a:latin typeface="Inconsolata" panose="00000509000000000000" pitchFamily="49" charset="0"/>
+              <a:rPr lang="en-US" sz="1600" dirty="0" err="1">
+                <a:latin typeface="Nunito Sans Black" pitchFamily="2" charset="0"/>
                 <a:ea typeface="Inconsolata" panose="00000509000000000000" pitchFamily="49" charset="0"/>
               </a:rPr>
               <a:t>cores_de_pele</a:t>
             </a:r>
-            <a:endParaRPr lang="pt-BR" sz="2000" dirty="0">
-              <a:latin typeface="Inconsolata" panose="00000509000000000000" pitchFamily="49" charset="0"/>
+            <a:endParaRPr lang="pt-BR" sz="1600" dirty="0">
+              <a:latin typeface="Nunito Sans Black" pitchFamily="2" charset="0"/>
               <a:ea typeface="Inconsolata" panose="00000509000000000000" pitchFamily="49" charset="0"/>
             </a:endParaRPr>
           </a:p>
@@ -4078,7 +4078,7 @@
         <p:spPr>
           <a:xfrm>
             <a:off x="4077978" y="522889"/>
-            <a:ext cx="1924665" cy="400110"/>
+            <a:ext cx="1924665" cy="338554"/>
           </a:xfrm>
           <a:prstGeom prst="rect">
             <a:avLst/>
@@ -4093,14 +4093,14 @@
           <a:p>
             <a:pPr algn="ctr"/>
             <a:r>
-              <a:rPr lang="en-US" sz="2000" dirty="0" err="1">
-                <a:latin typeface="Inconsolata" panose="00000509000000000000" pitchFamily="49" charset="0"/>
+              <a:rPr lang="en-US" sz="1600" dirty="0" err="1">
+                <a:latin typeface="Nunito Sans Black" pitchFamily="2" charset="0"/>
                 <a:ea typeface="Inconsolata" panose="00000509000000000000" pitchFamily="49" charset="0"/>
               </a:rPr>
               <a:t>alturas</a:t>
             </a:r>
-            <a:endParaRPr lang="pt-BR" sz="2000" dirty="0">
-              <a:latin typeface="Inconsolata" panose="00000509000000000000" pitchFamily="49" charset="0"/>
+            <a:endParaRPr lang="pt-BR" sz="1600" dirty="0">
+              <a:latin typeface="Nunito Sans Black" pitchFamily="2" charset="0"/>
               <a:ea typeface="Inconsolata" panose="00000509000000000000" pitchFamily="49" charset="0"/>
             </a:endParaRPr>
           </a:p>
@@ -4120,8 +4120,8 @@
         </p:nvSpPr>
         <p:spPr>
           <a:xfrm>
-            <a:off x="6915261" y="311748"/>
-            <a:ext cx="2504683" cy="707886"/>
+            <a:off x="7172238" y="358247"/>
+            <a:ext cx="2023945" cy="584775"/>
           </a:xfrm>
           <a:prstGeom prst="rect">
             <a:avLst/>
@@ -4136,35 +4136,35 @@
           <a:p>
             <a:pPr algn="ctr"/>
             <a:r>
-              <a:rPr lang="en-US" sz="2000" dirty="0" err="1">
-                <a:latin typeface="Inconsolata" panose="00000509000000000000" pitchFamily="49" charset="0"/>
+              <a:rPr lang="en-US" sz="1600" dirty="0" err="1">
+                <a:latin typeface="Nunito Sans Black" pitchFamily="2" charset="0"/>
                 <a:ea typeface="Inconsolata" panose="00000509000000000000" pitchFamily="49" charset="0"/>
               </a:rPr>
               <a:t>Tabela</a:t>
             </a:r>
             <a:r>
-              <a:rPr lang="en-US" sz="2000" dirty="0">
-                <a:latin typeface="Inconsolata" panose="00000509000000000000" pitchFamily="49" charset="0"/>
+              <a:rPr lang="en-US" sz="1600" dirty="0">
+                <a:latin typeface="Nunito Sans Black" pitchFamily="2" charset="0"/>
                 <a:ea typeface="Inconsolata" panose="00000509000000000000" pitchFamily="49" charset="0"/>
               </a:rPr>
               <a:t> </a:t>
             </a:r>
             <a:r>
-              <a:rPr lang="en-US" sz="2000" dirty="0" err="1">
-                <a:latin typeface="Inconsolata" panose="00000509000000000000" pitchFamily="49" charset="0"/>
+              <a:rPr lang="en-US" sz="1600" dirty="0" err="1">
+                <a:latin typeface="Nunito Sans Black" pitchFamily="2" charset="0"/>
                 <a:ea typeface="Inconsolata" panose="00000509000000000000" pitchFamily="49" charset="0"/>
               </a:rPr>
               <a:t>resultado</a:t>
             </a:r>
             <a:r>
-              <a:rPr lang="en-US" sz="2000" dirty="0">
-                <a:latin typeface="Inconsolata" panose="00000509000000000000" pitchFamily="49" charset="0"/>
+              <a:rPr lang="en-US" sz="1600" dirty="0">
+                <a:latin typeface="Nunito Sans Black" pitchFamily="2" charset="0"/>
                 <a:ea typeface="Inconsolata" panose="00000509000000000000" pitchFamily="49" charset="0"/>
               </a:rPr>
               <a:t> do JOIN</a:t>
             </a:r>
-            <a:endParaRPr lang="pt-BR" sz="2000" dirty="0">
-              <a:latin typeface="Inconsolata" panose="00000509000000000000" pitchFamily="49" charset="0"/>
+            <a:endParaRPr lang="pt-BR" sz="1600" dirty="0">
+              <a:latin typeface="Nunito Sans Black" pitchFamily="2" charset="0"/>
               <a:ea typeface="Inconsolata" panose="00000509000000000000" pitchFamily="49" charset="0"/>
             </a:endParaRPr>
           </a:p>

</xml_diff>